<commit_message>
Update to sample Python code
</commit_message>
<xml_diff>
--- a/Java in Education For JUGs 2.0 without notes.pptx
+++ b/Java in Education For JUGs 2.0 without notes.pptx
@@ -35,9 +35,9 @@
     <p:sldId id="279" r:id="rId23"/>
     <p:sldId id="275" r:id="rId24"/>
     <p:sldId id="276" r:id="rId25"/>
-    <p:sldId id="259" r:id="rId26"/>
-    <p:sldId id="260" r:id="rId27"/>
-    <p:sldId id="305" r:id="rId28"/>
+    <p:sldId id="308" r:id="rId26"/>
+    <p:sldId id="309" r:id="rId27"/>
+    <p:sldId id="310" r:id="rId28"/>
     <p:sldId id="263" r:id="rId29"/>
     <p:sldId id="264" r:id="rId30"/>
     <p:sldId id="285" r:id="rId31"/>
@@ -32978,7 +32978,7 @@
           <a:p>
             <a:fld id="{9121783E-A17C-4404-A1E8-2924B9744901}" type="datetimeFigureOut">
               <a:rPr lang="en-CA" smtClean="0"/>
-              <a:t>2023-11-07</a:t>
+              <a:t>2023-11-08</a:t>
             </a:fld>
             <a:endParaRPr lang="en-CA"/>
           </a:p>
@@ -33155,7 +33155,7 @@
           <a:p>
             <a:fld id="{38056CE0-E3A8-4B04-85A3-E31915DD9E24}" type="datetimeFigureOut">
               <a:rPr lang="en-CA" smtClean="0"/>
-              <a:t>2023-11-07</a:t>
+              <a:t>2023-11-08</a:t>
             </a:fld>
             <a:endParaRPr lang="en-CA"/>
           </a:p>
@@ -34763,6 +34763,65 @@
           <a:bodyPr/>
           <a:lstStyle/>
           <a:p>
+            <a:r>
+              <a:rPr lang="en-CA" dirty="0"/>
+              <a:t>Here is a simple program that calculates the monthly payment for money borrowed at a fixed rate.</a:t>
+            </a:r>
+          </a:p>
+          <a:p>
+            <a:endParaRPr lang="en-CA" dirty="0"/>
+          </a:p>
+          <a:p>
+            <a:r>
+              <a:rPr lang="en-CA" dirty="0"/>
+              <a:t>In Python it appears quite straightforward.</a:t>
+            </a:r>
+          </a:p>
+          <a:p>
+            <a:endParaRPr lang="en-CA" dirty="0"/>
+          </a:p>
+          <a:p>
+            <a:r>
+              <a:rPr lang="en-CA" dirty="0"/>
+              <a:t>Python is untyped so that data types of the variables are determined at runtime.,</a:t>
+            </a:r>
+          </a:p>
+          <a:p>
+            <a:endParaRPr lang="en-CA" dirty="0"/>
+          </a:p>
+          <a:p>
+            <a:r>
+              <a:rPr lang="en-CA" dirty="0"/>
+              <a:t>Also notice that input variables have to be cast to a type.</a:t>
+            </a:r>
+          </a:p>
+          <a:p>
+            <a:endParaRPr lang="en-CA" dirty="0"/>
+          </a:p>
+          <a:p>
+            <a:pPr marL="0" marR="0" lvl="0" indent="0" algn="l" defTabSz="914400" rtl="0" eaLnBrk="1" fontAlgn="auto" latinLnBrk="0" hangingPunct="1">
+              <a:lnSpc>
+                <a:spcPct val="100000"/>
+              </a:lnSpc>
+              <a:spcBef>
+                <a:spcPts val="0"/>
+              </a:spcBef>
+              <a:spcAft>
+                <a:spcPts val="0"/>
+              </a:spcAft>
+              <a:buClrTx/>
+              <a:buSzTx/>
+              <a:buFontTx/>
+              <a:buNone/>
+              <a:tabLst/>
+              <a:defRPr/>
+            </a:pPr>
+            <a:r>
+              <a:rPr lang="en-CA" dirty="0"/>
+              <a:t>I wonder what will happen if the interest rate is ‘bob’?</a:t>
+            </a:r>
+          </a:p>
+          <a:p>
             <a:endParaRPr lang="en-CA" dirty="0"/>
           </a:p>
         </p:txBody>
@@ -34847,6 +34906,39 @@
           <a:bodyPr/>
           <a:lstStyle/>
           <a:p>
+            <a:r>
+              <a:rPr lang="en-CA" dirty="0"/>
+              <a:t>Here is the same code in Java.</a:t>
+            </a:r>
+          </a:p>
+          <a:p>
+            <a:endParaRPr lang="en-CA" dirty="0"/>
+          </a:p>
+          <a:p>
+            <a:r>
+              <a:rPr lang="en-CA" dirty="0"/>
+              <a:t>Its longer because output and input are separate actions.</a:t>
+            </a:r>
+          </a:p>
+          <a:p>
+            <a:endParaRPr lang="en-CA" dirty="0"/>
+          </a:p>
+          <a:p>
+            <a:r>
+              <a:rPr lang="en-CA" dirty="0"/>
+              <a:t>What happens if I enter ‘bob’ as the interest rate? An exception will be thrown right where the invalid data is entered.</a:t>
+            </a:r>
+          </a:p>
+          <a:p>
+            <a:endParaRPr lang="en-CA" dirty="0"/>
+          </a:p>
+          <a:p>
+            <a:endParaRPr lang="en-CA" dirty="0"/>
+          </a:p>
+          <a:p>
+            <a:endParaRPr lang="en-CA" dirty="0"/>
+          </a:p>
+          <a:p>
             <a:endParaRPr lang="en-CA" dirty="0"/>
           </a:p>
         </p:txBody>
@@ -34930,6 +35022,20 @@
         <p:txBody>
           <a:bodyPr/>
           <a:lstStyle/>
+          <a:p>
+            <a:r>
+              <a:rPr lang="en-CA" dirty="0"/>
+              <a:t>Here is the Nameless </a:t>
+            </a:r>
+            <a:r>
+              <a:rPr lang="en-CA"/>
+              <a:t>class version.</a:t>
+            </a:r>
+            <a:endParaRPr lang="en-CA" dirty="0"/>
+          </a:p>
+          <a:p>
+            <a:endParaRPr lang="en-CA" dirty="0"/>
+          </a:p>
           <a:p>
             <a:endParaRPr lang="en-CA" dirty="0"/>
           </a:p>
@@ -36296,7 +36402,7 @@
           <a:p>
             <a:fld id="{34109114-E13B-445C-81F4-3F8D639FE469}" type="datetimeFigureOut">
               <a:rPr lang="en-CA" smtClean="0"/>
-              <a:t>2023-11-07</a:t>
+              <a:t>2023-11-08</a:t>
             </a:fld>
             <a:endParaRPr lang="en-CA"/>
           </a:p>
@@ -36496,7 +36602,7 @@
           <a:p>
             <a:fld id="{34109114-E13B-445C-81F4-3F8D639FE469}" type="datetimeFigureOut">
               <a:rPr lang="en-CA" smtClean="0"/>
-              <a:t>2023-11-07</a:t>
+              <a:t>2023-11-08</a:t>
             </a:fld>
             <a:endParaRPr lang="en-CA"/>
           </a:p>
@@ -36706,7 +36812,7 @@
           <a:p>
             <a:fld id="{34109114-E13B-445C-81F4-3F8D639FE469}" type="datetimeFigureOut">
               <a:rPr lang="en-CA" smtClean="0"/>
-              <a:t>2023-11-07</a:t>
+              <a:t>2023-11-08</a:t>
             </a:fld>
             <a:endParaRPr lang="en-CA"/>
           </a:p>
@@ -36906,7 +37012,7 @@
           <a:p>
             <a:fld id="{34109114-E13B-445C-81F4-3F8D639FE469}" type="datetimeFigureOut">
               <a:rPr lang="en-CA" smtClean="0"/>
-              <a:t>2023-11-07</a:t>
+              <a:t>2023-11-08</a:t>
             </a:fld>
             <a:endParaRPr lang="en-CA"/>
           </a:p>
@@ -37182,7 +37288,7 @@
           <a:p>
             <a:fld id="{34109114-E13B-445C-81F4-3F8D639FE469}" type="datetimeFigureOut">
               <a:rPr lang="en-CA" smtClean="0"/>
-              <a:t>2023-11-07</a:t>
+              <a:t>2023-11-08</a:t>
             </a:fld>
             <a:endParaRPr lang="en-CA"/>
           </a:p>
@@ -37450,7 +37556,7 @@
           <a:p>
             <a:fld id="{34109114-E13B-445C-81F4-3F8D639FE469}" type="datetimeFigureOut">
               <a:rPr lang="en-CA" smtClean="0"/>
-              <a:t>2023-11-07</a:t>
+              <a:t>2023-11-08</a:t>
             </a:fld>
             <a:endParaRPr lang="en-CA"/>
           </a:p>
@@ -37865,7 +37971,7 @@
           <a:p>
             <a:fld id="{34109114-E13B-445C-81F4-3F8D639FE469}" type="datetimeFigureOut">
               <a:rPr lang="en-CA" smtClean="0"/>
-              <a:t>2023-11-07</a:t>
+              <a:t>2023-11-08</a:t>
             </a:fld>
             <a:endParaRPr lang="en-CA"/>
           </a:p>
@@ -38007,7 +38113,7 @@
           <a:p>
             <a:fld id="{34109114-E13B-445C-81F4-3F8D639FE469}" type="datetimeFigureOut">
               <a:rPr lang="en-CA" smtClean="0"/>
-              <a:t>2023-11-07</a:t>
+              <a:t>2023-11-08</a:t>
             </a:fld>
             <a:endParaRPr lang="en-CA"/>
           </a:p>
@@ -38120,7 +38226,7 @@
           <a:p>
             <a:fld id="{34109114-E13B-445C-81F4-3F8D639FE469}" type="datetimeFigureOut">
               <a:rPr lang="en-CA" smtClean="0"/>
-              <a:t>2023-11-07</a:t>
+              <a:t>2023-11-08</a:t>
             </a:fld>
             <a:endParaRPr lang="en-CA"/>
           </a:p>
@@ -38433,7 +38539,7 @@
           <a:p>
             <a:fld id="{34109114-E13B-445C-81F4-3F8D639FE469}" type="datetimeFigureOut">
               <a:rPr lang="en-CA" smtClean="0"/>
-              <a:t>2023-11-07</a:t>
+              <a:t>2023-11-08</a:t>
             </a:fld>
             <a:endParaRPr lang="en-CA"/>
           </a:p>
@@ -38722,7 +38828,7 @@
           <a:p>
             <a:fld id="{34109114-E13B-445C-81F4-3F8D639FE469}" type="datetimeFigureOut">
               <a:rPr lang="en-CA" smtClean="0"/>
-              <a:t>2023-11-07</a:t>
+              <a:t>2023-11-08</a:t>
             </a:fld>
             <a:endParaRPr lang="en-CA"/>
           </a:p>
@@ -38965,7 +39071,7 @@
           <a:p>
             <a:fld id="{34109114-E13B-445C-81F4-3F8D639FE469}" type="datetimeFigureOut">
               <a:rPr lang="en-CA" smtClean="0"/>
-              <a:t>2023-11-07</a:t>
+              <a:t>2023-11-08</a:t>
             </a:fld>
             <a:endParaRPr lang="en-CA"/>
           </a:p>
@@ -39881,13 +39987,13 @@
   <p:clrMapOvr>
     <a:masterClrMapping/>
   </p:clrMapOvr>
-  <mc:AlternateContent xmlns:mc="http://schemas.openxmlformats.org/markup-compatibility/2006">
-    <mc:Choice xmlns:p159="http://schemas.microsoft.com/office/powerpoint/2015/09/main" Requires="p159">
+  <mc:AlternateContent xmlns:mc="http://schemas.openxmlformats.org/markup-compatibility/2006" xmlns:p159="http://schemas.microsoft.com/office/powerpoint/2015/09/main">
+    <mc:Choice Requires="p159">
       <p:transition xmlns:p14="http://schemas.microsoft.com/office/powerpoint/2010/main" spd="slow" p14:dur="2000">
         <p159:morph option="byWord"/>
       </p:transition>
     </mc:Choice>
-    <mc:Fallback>
+    <mc:Fallback xmlns="">
       <p:transition spd="slow">
         <p:fade/>
       </p:transition>
@@ -40124,13 +40230,13 @@
   <p:clrMapOvr>
     <a:masterClrMapping/>
   </p:clrMapOvr>
-  <mc:AlternateContent xmlns:mc="http://schemas.openxmlformats.org/markup-compatibility/2006">
-    <mc:Choice xmlns:p159="http://schemas.microsoft.com/office/powerpoint/2015/09/main" Requires="p159">
+  <mc:AlternateContent xmlns:mc="http://schemas.openxmlformats.org/markup-compatibility/2006" xmlns:p159="http://schemas.microsoft.com/office/powerpoint/2015/09/main">
+    <mc:Choice Requires="p159">
       <p:transition xmlns:p14="http://schemas.microsoft.com/office/powerpoint/2010/main" spd="slow" p14:dur="2000">
         <p159:morph option="byWord"/>
       </p:transition>
     </mc:Choice>
-    <mc:Fallback>
+    <mc:Fallback xmlns="">
       <p:transition spd="slow">
         <p:fade/>
       </p:transition>
@@ -40680,13 +40786,13 @@
   <p:clrMapOvr>
     <a:masterClrMapping/>
   </p:clrMapOvr>
-  <mc:AlternateContent xmlns:mc="http://schemas.openxmlformats.org/markup-compatibility/2006">
-    <mc:Choice xmlns:p159="http://schemas.microsoft.com/office/powerpoint/2015/09/main" Requires="p159">
+  <mc:AlternateContent xmlns:mc="http://schemas.openxmlformats.org/markup-compatibility/2006" xmlns:p159="http://schemas.microsoft.com/office/powerpoint/2015/09/main">
+    <mc:Choice Requires="p159">
       <p:transition xmlns:p14="http://schemas.microsoft.com/office/powerpoint/2010/main" spd="slow" p14:dur="2000">
         <p159:morph option="byWord"/>
       </p:transition>
     </mc:Choice>
-    <mc:Fallback>
+    <mc:Fallback xmlns="">
       <p:transition spd="slow">
         <p:fade/>
       </p:transition>
@@ -41442,13 +41548,13 @@
   <p:clrMapOvr>
     <a:masterClrMapping/>
   </p:clrMapOvr>
-  <mc:AlternateContent xmlns:mc="http://schemas.openxmlformats.org/markup-compatibility/2006">
-    <mc:Choice xmlns:p159="http://schemas.microsoft.com/office/powerpoint/2015/09/main" Requires="p159">
+  <mc:AlternateContent xmlns:mc="http://schemas.openxmlformats.org/markup-compatibility/2006" xmlns:p159="http://schemas.microsoft.com/office/powerpoint/2015/09/main">
+    <mc:Choice Requires="p159">
       <p:transition xmlns:p14="http://schemas.microsoft.com/office/powerpoint/2010/main" spd="slow" p14:dur="2000">
         <p159:morph option="byWord"/>
       </p:transition>
     </mc:Choice>
-    <mc:Fallback>
+    <mc:Fallback xmlns="">
       <p:transition spd="slow">
         <p:fade/>
       </p:transition>
@@ -42222,13 +42328,13 @@
   <p:clrMapOvr>
     <a:masterClrMapping/>
   </p:clrMapOvr>
-  <mc:AlternateContent xmlns:mc="http://schemas.openxmlformats.org/markup-compatibility/2006">
-    <mc:Choice xmlns:p159="http://schemas.microsoft.com/office/powerpoint/2015/09/main" Requires="p159">
+  <mc:AlternateContent xmlns:mc="http://schemas.openxmlformats.org/markup-compatibility/2006" xmlns:p159="http://schemas.microsoft.com/office/powerpoint/2015/09/main">
+    <mc:Choice Requires="p159">
       <p:transition xmlns:p14="http://schemas.microsoft.com/office/powerpoint/2010/main" spd="slow" p14:dur="2000">
         <p159:morph option="byWord"/>
       </p:transition>
     </mc:Choice>
-    <mc:Fallback>
+    <mc:Fallback xmlns="">
       <p:transition spd="slow">
         <p:fade/>
       </p:transition>
@@ -43009,13 +43115,13 @@
   <p:clrMapOvr>
     <a:masterClrMapping/>
   </p:clrMapOvr>
-  <mc:AlternateContent xmlns:mc="http://schemas.openxmlformats.org/markup-compatibility/2006">
-    <mc:Choice xmlns:p159="http://schemas.microsoft.com/office/powerpoint/2015/09/main" Requires="p159">
+  <mc:AlternateContent xmlns:mc="http://schemas.openxmlformats.org/markup-compatibility/2006" xmlns:p159="http://schemas.microsoft.com/office/powerpoint/2015/09/main">
+    <mc:Choice Requires="p159">
       <p:transition xmlns:p14="http://schemas.microsoft.com/office/powerpoint/2010/main" spd="slow" p14:dur="2000">
         <p159:morph option="byWord"/>
       </p:transition>
     </mc:Choice>
-    <mc:Fallback>
+    <mc:Fallback xmlns="">
       <p:transition spd="slow">
         <p:fade/>
       </p:transition>
@@ -43129,13 +43235,13 @@
   <p:clrMapOvr>
     <a:overrideClrMapping bg1="dk1" tx1="lt1" bg2="dk2" tx2="lt2" accent1="accent1" accent2="accent2" accent3="accent3" accent4="accent4" accent5="accent5" accent6="accent6" hlink="hlink" folHlink="folHlink"/>
   </p:clrMapOvr>
-  <mc:AlternateContent xmlns:mc="http://schemas.openxmlformats.org/markup-compatibility/2006">
-    <mc:Choice xmlns:p159="http://schemas.microsoft.com/office/powerpoint/2015/09/main" Requires="p159">
+  <mc:AlternateContent xmlns:mc="http://schemas.openxmlformats.org/markup-compatibility/2006" xmlns:p159="http://schemas.microsoft.com/office/powerpoint/2015/09/main">
+    <mc:Choice Requires="p159">
       <p:transition xmlns:p14="http://schemas.microsoft.com/office/powerpoint/2010/main" spd="slow" p14:dur="2000">
         <p159:morph option="byWord"/>
       </p:transition>
     </mc:Choice>
-    <mc:Fallback>
+    <mc:Fallback xmlns="">
       <p:transition spd="slow">
         <p:fade/>
       </p:transition>
@@ -43756,13 +43862,13 @@
   <p:clrMapOvr>
     <a:masterClrMapping/>
   </p:clrMapOvr>
-  <mc:AlternateContent xmlns:mc="http://schemas.openxmlformats.org/markup-compatibility/2006">
-    <mc:Choice xmlns:p159="http://schemas.microsoft.com/office/powerpoint/2015/09/main" Requires="p159">
+  <mc:AlternateContent xmlns:mc="http://schemas.openxmlformats.org/markup-compatibility/2006" xmlns:p159="http://schemas.microsoft.com/office/powerpoint/2015/09/main">
+    <mc:Choice Requires="p159">
       <p:transition xmlns:p14="http://schemas.microsoft.com/office/powerpoint/2010/main" spd="slow" p14:dur="2000">
         <p159:morph option="byWord"/>
       </p:transition>
     </mc:Choice>
-    <mc:Fallback>
+    <mc:Fallback xmlns="">
       <p:transition spd="slow">
         <p:fade/>
       </p:transition>
@@ -44081,13 +44187,13 @@
   <p:clrMapOvr>
     <a:overrideClrMapping bg1="dk1" tx1="lt1" bg2="dk2" tx2="lt2" accent1="accent1" accent2="accent2" accent3="accent3" accent4="accent4" accent5="accent5" accent6="accent6" hlink="hlink" folHlink="folHlink"/>
   </p:clrMapOvr>
-  <mc:AlternateContent xmlns:mc="http://schemas.openxmlformats.org/markup-compatibility/2006">
-    <mc:Choice xmlns:p159="http://schemas.microsoft.com/office/powerpoint/2015/09/main" Requires="p159">
+  <mc:AlternateContent xmlns:mc="http://schemas.openxmlformats.org/markup-compatibility/2006" xmlns:p159="http://schemas.microsoft.com/office/powerpoint/2015/09/main">
+    <mc:Choice Requires="p159">
       <p:transition xmlns:p14="http://schemas.microsoft.com/office/powerpoint/2010/main" spd="slow" p14:dur="2000">
         <p159:morph option="byWord"/>
       </p:transition>
     </mc:Choice>
-    <mc:Fallback>
+    <mc:Fallback xmlns="">
       <p:transition spd="slow">
         <p:fade/>
       </p:transition>
@@ -44339,13 +44445,13 @@
   <p:clrMapOvr>
     <a:masterClrMapping/>
   </p:clrMapOvr>
-  <mc:AlternateContent xmlns:mc="http://schemas.openxmlformats.org/markup-compatibility/2006">
-    <mc:Choice xmlns:p159="http://schemas.microsoft.com/office/powerpoint/2015/09/main" Requires="p159">
+  <mc:AlternateContent xmlns:mc="http://schemas.openxmlformats.org/markup-compatibility/2006" xmlns:p159="http://schemas.microsoft.com/office/powerpoint/2015/09/main">
+    <mc:Choice Requires="p159">
       <p:transition xmlns:p14="http://schemas.microsoft.com/office/powerpoint/2010/main" spd="slow" p14:dur="2000">
         <p159:morph option="byWord"/>
       </p:transition>
     </mc:Choice>
-    <mc:Fallback>
+    <mc:Fallback xmlns="">
       <p:transition spd="slow">
         <p:fade/>
       </p:transition>
@@ -45427,13 +45533,13 @@
   <p:clrMapOvr>
     <a:masterClrMapping/>
   </p:clrMapOvr>
-  <mc:AlternateContent xmlns:mc="http://schemas.openxmlformats.org/markup-compatibility/2006">
-    <mc:Choice xmlns:p159="http://schemas.microsoft.com/office/powerpoint/2015/09/main" Requires="p159">
+  <mc:AlternateContent xmlns:mc="http://schemas.openxmlformats.org/markup-compatibility/2006" xmlns:p159="http://schemas.microsoft.com/office/powerpoint/2015/09/main">
+    <mc:Choice Requires="p159">
       <p:transition xmlns:p14="http://schemas.microsoft.com/office/powerpoint/2010/main" spd="slow" p14:dur="2000">
         <p159:morph option="byWord"/>
       </p:transition>
     </mc:Choice>
-    <mc:Fallback>
+    <mc:Fallback xmlns="">
       <p:transition spd="slow">
         <p:fade/>
       </p:transition>
@@ -45944,13 +46050,13 @@
   <p:clrMapOvr>
     <a:masterClrMapping/>
   </p:clrMapOvr>
-  <mc:AlternateContent xmlns:mc="http://schemas.openxmlformats.org/markup-compatibility/2006">
-    <mc:Choice xmlns:p159="http://schemas.microsoft.com/office/powerpoint/2015/09/main" Requires="p159">
+  <mc:AlternateContent xmlns:mc="http://schemas.openxmlformats.org/markup-compatibility/2006" xmlns:p159="http://schemas.microsoft.com/office/powerpoint/2015/09/main">
+    <mc:Choice Requires="p159">
       <p:transition xmlns:p14="http://schemas.microsoft.com/office/powerpoint/2010/main" spd="slow" p14:dur="2000">
         <p159:morph option="byWord"/>
       </p:transition>
     </mc:Choice>
-    <mc:Fallback>
+    <mc:Fallback xmlns="">
       <p:transition spd="slow">
         <p:fade/>
       </p:transition>
@@ -46808,13 +46914,13 @@
   <p:clrMapOvr>
     <a:masterClrMapping/>
   </p:clrMapOvr>
-  <mc:AlternateContent xmlns:mc="http://schemas.openxmlformats.org/markup-compatibility/2006">
-    <mc:Choice xmlns:p159="http://schemas.microsoft.com/office/powerpoint/2015/09/main" Requires="p159">
+  <mc:AlternateContent xmlns:mc="http://schemas.openxmlformats.org/markup-compatibility/2006" xmlns:p159="http://schemas.microsoft.com/office/powerpoint/2015/09/main">
+    <mc:Choice Requires="p159">
       <p:transition xmlns:p14="http://schemas.microsoft.com/office/powerpoint/2010/main" spd="slow" p14:dur="2000">
         <p159:morph option="byWord"/>
       </p:transition>
     </mc:Choice>
-    <mc:Fallback>
+    <mc:Fallback xmlns="">
       <p:transition spd="slow">
         <p:fade/>
       </p:transition>
@@ -47043,13 +47149,13 @@
   <p:clrMapOvr>
     <a:masterClrMapping/>
   </p:clrMapOvr>
-  <mc:AlternateContent xmlns:mc="http://schemas.openxmlformats.org/markup-compatibility/2006">
-    <mc:Choice xmlns:p159="http://schemas.microsoft.com/office/powerpoint/2015/09/main" Requires="p159">
+  <mc:AlternateContent xmlns:mc="http://schemas.openxmlformats.org/markup-compatibility/2006" xmlns:p159="http://schemas.microsoft.com/office/powerpoint/2015/09/main">
+    <mc:Choice Requires="p159">
       <p:transition xmlns:p14="http://schemas.microsoft.com/office/powerpoint/2010/main" spd="slow" p14:dur="2000">
         <p159:morph option="byWord"/>
       </p:transition>
     </mc:Choice>
-    <mc:Fallback>
+    <mc:Fallback xmlns="">
       <p:transition spd="slow">
         <p:fade/>
       </p:transition>
@@ -47293,13 +47399,13 @@
   <p:clrMapOvr>
     <a:masterClrMapping/>
   </p:clrMapOvr>
-  <mc:AlternateContent xmlns:mc="http://schemas.openxmlformats.org/markup-compatibility/2006">
-    <mc:Choice xmlns:p159="http://schemas.microsoft.com/office/powerpoint/2015/09/main" Requires="p159">
+  <mc:AlternateContent xmlns:mc="http://schemas.openxmlformats.org/markup-compatibility/2006" xmlns:p159="http://schemas.microsoft.com/office/powerpoint/2015/09/main">
+    <mc:Choice Requires="p159">
       <p:transition xmlns:p14="http://schemas.microsoft.com/office/powerpoint/2010/main" spd="slow" p14:dur="2000">
         <p159:morph option="byWord"/>
       </p:transition>
     </mc:Choice>
-    <mc:Fallback>
+    <mc:Fallback xmlns="">
       <p:transition spd="slow">
         <p:fade/>
       </p:transition>
@@ -47325,153 +47431,6 @@
           <a:chExt cx="0" cy="0"/>
         </a:xfrm>
       </p:grpSpPr>
-      <p:sp>
-        <p:nvSpPr>
-          <p:cNvPr id="4" name="Rectangle 3">
-            <a:extLst>
-              <a:ext uri="{FF2B5EF4-FFF2-40B4-BE49-F238E27FC236}">
-                <a16:creationId xmlns:a16="http://schemas.microsoft.com/office/drawing/2014/main" id="{BC4ED6C1-0F8A-4F69-AE1F-13A8285AA15C}"/>
-              </a:ext>
-            </a:extLst>
-          </p:cNvPr>
-          <p:cNvSpPr/>
-          <p:nvPr/>
-        </p:nvSpPr>
-        <p:spPr>
-          <a:xfrm>
-            <a:off x="2346158" y="2628248"/>
-            <a:ext cx="12093677" cy="1890261"/>
-          </a:xfrm>
-          <a:prstGeom prst="rect">
-            <a:avLst/>
-          </a:prstGeom>
-        </p:spPr>
-        <p:txBody>
-          <a:bodyPr wrap="square">
-            <a:spAutoFit/>
-          </a:bodyPr>
-          <a:lstStyle/>
-          <a:p>
-            <a:pPr>
-              <a:spcAft>
-                <a:spcPts val="500"/>
-              </a:spcAft>
-            </a:pPr>
-            <a:r>
-              <a:rPr lang="en-CA" sz="1600" b="1" dirty="0">
-                <a:latin typeface="Consolas" panose="020B0609020204030204" pitchFamily="49" charset="0"/>
-                <a:ea typeface="M+ 1m" panose="020B0509020203020207" pitchFamily="49" charset="-128"/>
-              </a:rPr>
-              <a:t>loan = input("           loan: ")</a:t>
-            </a:r>
-          </a:p>
-          <a:p>
-            <a:pPr>
-              <a:spcAft>
-                <a:spcPts val="500"/>
-              </a:spcAft>
-            </a:pPr>
-            <a:r>
-              <a:rPr lang="en-CA" sz="1600" b="1" dirty="0">
-                <a:latin typeface="Consolas" panose="020B0609020204030204" pitchFamily="49" charset="0"/>
-                <a:ea typeface="M+ 1m" panose="020B0509020203020207" pitchFamily="49" charset="-128"/>
-              </a:rPr>
-              <a:t>interest = input("       interest: ")</a:t>
-            </a:r>
-          </a:p>
-          <a:p>
-            <a:pPr>
-              <a:spcAft>
-                <a:spcPts val="500"/>
-              </a:spcAft>
-            </a:pPr>
-            <a:r>
-              <a:rPr lang="en-CA" sz="1600" b="1" dirty="0">
-                <a:latin typeface="Consolas" panose="020B0609020204030204" pitchFamily="49" charset="0"/>
-                <a:ea typeface="M+ 1m" panose="020B0509020203020207" pitchFamily="49" charset="-128"/>
-              </a:rPr>
-              <a:t>term = input("           term: ")</a:t>
-            </a:r>
-          </a:p>
-          <a:p>
-            <a:pPr>
-              <a:spcAft>
-                <a:spcPts val="500"/>
-              </a:spcAft>
-            </a:pPr>
-            <a:r>
-              <a:rPr lang="en-CA" sz="1600" b="1" dirty="0" err="1">
-                <a:latin typeface="Consolas" panose="020B0609020204030204" pitchFamily="49" charset="0"/>
-                <a:ea typeface="M+ 1m" panose="020B0509020203020207" pitchFamily="49" charset="-128"/>
-              </a:rPr>
-              <a:t>tempInterest</a:t>
-            </a:r>
-            <a:r>
-              <a:rPr lang="en-CA" sz="1600" b="1" dirty="0">
-                <a:latin typeface="Consolas" panose="020B0609020204030204" pitchFamily="49" charset="0"/>
-                <a:ea typeface="M+ 1m" panose="020B0509020203020207" pitchFamily="49" charset="-128"/>
-              </a:rPr>
-              <a:t> = float(interest) / 12;</a:t>
-            </a:r>
-          </a:p>
-          <a:p>
-            <a:pPr>
-              <a:spcAft>
-                <a:spcPts val="500"/>
-              </a:spcAft>
-            </a:pPr>
-            <a:r>
-              <a:rPr lang="en-CA" sz="1600" b="1" dirty="0">
-                <a:latin typeface="Consolas" panose="020B0609020204030204" pitchFamily="49" charset="0"/>
-                <a:ea typeface="M+ 1m" panose="020B0509020203020207" pitchFamily="49" charset="-128"/>
-              </a:rPr>
-              <a:t>result = float(loan)*(</a:t>
-            </a:r>
-            <a:r>
-              <a:rPr lang="en-CA" sz="1600" b="1" dirty="0" err="1">
-                <a:latin typeface="Consolas" panose="020B0609020204030204" pitchFamily="49" charset="0"/>
-                <a:ea typeface="M+ 1m" panose="020B0509020203020207" pitchFamily="49" charset="-128"/>
-              </a:rPr>
-              <a:t>tempInterest</a:t>
-            </a:r>
-            <a:r>
-              <a:rPr lang="en-CA" sz="1600" b="1" dirty="0">
-                <a:latin typeface="Consolas" panose="020B0609020204030204" pitchFamily="49" charset="0"/>
-                <a:ea typeface="M+ 1m" panose="020B0509020203020207" pitchFamily="49" charset="-128"/>
-              </a:rPr>
-              <a:t> / (1 - ((1 + </a:t>
-            </a:r>
-            <a:r>
-              <a:rPr lang="en-CA" sz="1600" b="1" dirty="0" err="1">
-                <a:latin typeface="Consolas" panose="020B0609020204030204" pitchFamily="49" charset="0"/>
-                <a:ea typeface="M+ 1m" panose="020B0509020203020207" pitchFamily="49" charset="-128"/>
-              </a:rPr>
-              <a:t>tempInterest</a:t>
-            </a:r>
-            <a:r>
-              <a:rPr lang="en-CA" sz="1600" b="1" dirty="0">
-                <a:latin typeface="Consolas" panose="020B0609020204030204" pitchFamily="49" charset="0"/>
-                <a:ea typeface="M+ 1m" panose="020B0509020203020207" pitchFamily="49" charset="-128"/>
-              </a:rPr>
-              <a:t>) ** -float(term))));</a:t>
-            </a:r>
-          </a:p>
-          <a:p>
-            <a:pPr>
-              <a:spcAft>
-                <a:spcPts val="500"/>
-              </a:spcAft>
-            </a:pPr>
-            <a:r>
-              <a:rPr lang="en-CA" sz="1600" b="1" dirty="0">
-                <a:latin typeface="Consolas" panose="020B0609020204030204" pitchFamily="49" charset="0"/>
-                <a:ea typeface="M+ 1m" panose="020B0509020203020207" pitchFamily="49" charset="-128"/>
-              </a:rPr>
-              <a:t>print("Monthly Payment: %.2f" % result)</a:t>
-            </a:r>
-          </a:p>
-        </p:txBody>
-      </p:sp>
       <p:sp>
         <p:nvSpPr>
           <p:cNvPr id="5" name="Rectangle 4">
@@ -47580,23 +47539,178 @@
           </a:p>
         </p:txBody>
       </p:sp>
+      <p:sp>
+        <p:nvSpPr>
+          <p:cNvPr id="9" name="TextBox 8">
+            <a:extLst>
+              <a:ext uri="{FF2B5EF4-FFF2-40B4-BE49-F238E27FC236}">
+                <a16:creationId xmlns:a16="http://schemas.microsoft.com/office/drawing/2014/main" id="{710BF38C-B12A-DEB7-C2A7-0DCC212BE9C6}"/>
+              </a:ext>
+            </a:extLst>
+          </p:cNvPr>
+          <p:cNvSpPr txBox="1"/>
+          <p:nvPr/>
+        </p:nvSpPr>
+        <p:spPr>
+          <a:xfrm>
+            <a:off x="3048000" y="1563862"/>
+            <a:ext cx="8916226" cy="2923877"/>
+          </a:xfrm>
+          <a:prstGeom prst="rect">
+            <a:avLst/>
+          </a:prstGeom>
+          <a:noFill/>
+        </p:spPr>
+        <p:txBody>
+          <a:bodyPr wrap="square">
+            <a:spAutoFit/>
+          </a:bodyPr>
+          <a:lstStyle/>
+          <a:p>
+            <a:pPr>
+              <a:lnSpc>
+                <a:spcPct val="150000"/>
+              </a:lnSpc>
+            </a:pPr>
+            <a:r>
+              <a:rPr lang="en-US" sz="1600" b="1" dirty="0">
+                <a:latin typeface="Consolas" panose="020B0609020204030204" pitchFamily="49" charset="0"/>
+              </a:rPr>
+              <a:t>loan = 1000.0</a:t>
+            </a:r>
+          </a:p>
+          <a:p>
+            <a:pPr>
+              <a:lnSpc>
+                <a:spcPct val="150000"/>
+              </a:lnSpc>
+            </a:pPr>
+            <a:r>
+              <a:rPr lang="en-US" sz="1600" b="1" dirty="0">
+                <a:latin typeface="Consolas" panose="020B0609020204030204" pitchFamily="49" charset="0"/>
+              </a:rPr>
+              <a:t>interest 0.05</a:t>
+            </a:r>
+          </a:p>
+          <a:p>
+            <a:pPr>
+              <a:lnSpc>
+                <a:spcPct val="150000"/>
+              </a:lnSpc>
+            </a:pPr>
+            <a:r>
+              <a:rPr lang="en-US" sz="1600" b="1" dirty="0">
+                <a:latin typeface="Consolas" panose="020B0609020204030204" pitchFamily="49" charset="0"/>
+              </a:rPr>
+              <a:t>term = 5</a:t>
+            </a:r>
+          </a:p>
+          <a:p>
+            <a:pPr>
+              <a:lnSpc>
+                <a:spcPct val="150000"/>
+              </a:lnSpc>
+            </a:pPr>
+            <a:r>
+              <a:rPr lang="en-US" sz="1600" b="1" dirty="0" err="1">
+                <a:latin typeface="Consolas" panose="020B0609020204030204" pitchFamily="49" charset="0"/>
+              </a:rPr>
+              <a:t>tempInterest</a:t>
+            </a:r>
+            <a:r>
+              <a:rPr lang="en-US" sz="1600" b="1" dirty="0">
+                <a:latin typeface="Consolas" panose="020B0609020204030204" pitchFamily="49" charset="0"/>
+              </a:rPr>
+              <a:t> = float(interest) / 12;</a:t>
+            </a:r>
+          </a:p>
+          <a:p>
+            <a:pPr>
+              <a:lnSpc>
+                <a:spcPct val="150000"/>
+              </a:lnSpc>
+            </a:pPr>
+            <a:r>
+              <a:rPr lang="en-US" sz="1600" b="1" dirty="0">
+                <a:latin typeface="Consolas" panose="020B0609020204030204" pitchFamily="49" charset="0"/>
+              </a:rPr>
+              <a:t>result = float(loan) * \</a:t>
+            </a:r>
+          </a:p>
+          <a:p>
+            <a:pPr>
+              <a:lnSpc>
+                <a:spcPct val="150000"/>
+              </a:lnSpc>
+            </a:pPr>
+            <a:r>
+              <a:rPr lang="en-US" sz="1600" b="1" dirty="0">
+                <a:latin typeface="Consolas" panose="020B0609020204030204" pitchFamily="49" charset="0"/>
+              </a:rPr>
+              <a:t>   (</a:t>
+            </a:r>
+            <a:r>
+              <a:rPr lang="en-US" sz="1600" b="1" dirty="0" err="1">
+                <a:latin typeface="Consolas" panose="020B0609020204030204" pitchFamily="49" charset="0"/>
+              </a:rPr>
+              <a:t>tempInterest</a:t>
+            </a:r>
+            <a:r>
+              <a:rPr lang="en-US" sz="1600" b="1" dirty="0">
+                <a:latin typeface="Consolas" panose="020B0609020204030204" pitchFamily="49" charset="0"/>
+              </a:rPr>
+              <a:t> / (1.0 - ((1.0 + </a:t>
+            </a:r>
+            <a:r>
+              <a:rPr lang="en-US" sz="1600" b="1" dirty="0" err="1">
+                <a:latin typeface="Consolas" panose="020B0609020204030204" pitchFamily="49" charset="0"/>
+              </a:rPr>
+              <a:t>tempInterest</a:t>
+            </a:r>
+            <a:r>
+              <a:rPr lang="en-US" sz="1600" b="1" dirty="0">
+                <a:latin typeface="Consolas" panose="020B0609020204030204" pitchFamily="49" charset="0"/>
+              </a:rPr>
+              <a:t>) ** -float(term))));</a:t>
+            </a:r>
+          </a:p>
+          <a:p>
+            <a:pPr>
+              <a:lnSpc>
+                <a:spcPct val="150000"/>
+              </a:lnSpc>
+            </a:pPr>
+            <a:r>
+              <a:rPr lang="en-US" sz="1600" b="1" dirty="0">
+                <a:latin typeface="Consolas" panose="020B0609020204030204" pitchFamily="49" charset="0"/>
+              </a:rPr>
+              <a:t>print("Monthly Payment: %.2f" % result)</a:t>
+            </a:r>
+          </a:p>
+          <a:p>
+            <a:endParaRPr lang="en-US" sz="1600" b="1" dirty="0">
+              <a:latin typeface="Consolas" panose="020B0609020204030204" pitchFamily="49" charset="0"/>
+            </a:endParaRPr>
+          </a:p>
+        </p:txBody>
+      </p:sp>
     </p:spTree>
     <p:extLst>
       <p:ext uri="{BB962C8B-B14F-4D97-AF65-F5344CB8AC3E}">
-        <p14:creationId xmlns:p14="http://schemas.microsoft.com/office/powerpoint/2010/main" val="3364357665"/>
+        <p14:creationId xmlns:p14="http://schemas.microsoft.com/office/powerpoint/2010/main" val="2897427344"/>
       </p:ext>
     </p:extLst>
   </p:cSld>
   <p:clrMapOvr>
     <a:masterClrMapping/>
   </p:clrMapOvr>
-  <mc:AlternateContent xmlns:mc="http://schemas.openxmlformats.org/markup-compatibility/2006">
-    <mc:Choice xmlns:p159="http://schemas.microsoft.com/office/powerpoint/2015/09/main" Requires="p159">
+  <mc:AlternateContent xmlns:mc="http://schemas.openxmlformats.org/markup-compatibility/2006" xmlns:p159="http://schemas.microsoft.com/office/powerpoint/2015/09/main">
+    <mc:Choice Requires="p159">
       <p:transition xmlns:p14="http://schemas.microsoft.com/office/powerpoint/2010/main" spd="slow" p14:dur="2000">
         <p159:morph option="byWord"/>
       </p:transition>
     </mc:Choice>
-    <mc:Fallback>
+    <mc:Fallback xmlns="">
       <p:transition spd="slow">
         <p:fade/>
       </p:transition>
@@ -47636,8 +47750,8 @@
         </p:nvSpPr>
         <p:spPr>
           <a:xfrm>
-            <a:off x="1929284" y="817076"/>
-            <a:ext cx="9715469" cy="5304016"/>
+            <a:off x="1735015" y="817076"/>
+            <a:ext cx="10456985" cy="5016758"/>
           </a:xfrm>
           <a:prstGeom prst="rect">
             <a:avLst/>
@@ -47649,11 +47763,6 @@
           </a:bodyPr>
           <a:lstStyle/>
           <a:p>
-            <a:pPr>
-              <a:spcAft>
-                <a:spcPts val="500"/>
-              </a:spcAft>
-            </a:pPr>
             <a:r>
               <a:rPr lang="en-CA" sz="1600" b="1" dirty="0">
                 <a:latin typeface="Consolas" panose="020B0609020204030204" pitchFamily="49" charset="0"/>
@@ -47677,22 +47786,12 @@
             </a:r>
           </a:p>
           <a:p>
-            <a:pPr>
-              <a:spcAft>
-                <a:spcPts val="500"/>
-              </a:spcAft>
-            </a:pPr>
             <a:endParaRPr lang="en-CA" sz="1600" b="1" dirty="0">
               <a:latin typeface="Consolas" panose="020B0609020204030204" pitchFamily="49" charset="0"/>
               <a:ea typeface="M+ 1m" panose="020B0509020203020207" pitchFamily="49" charset="-128"/>
             </a:endParaRPr>
           </a:p>
           <a:p>
-            <a:pPr>
-              <a:spcAft>
-                <a:spcPts val="500"/>
-              </a:spcAft>
-            </a:pPr>
             <a:r>
               <a:rPr lang="en-CA" sz="1600" b="1" dirty="0">
                 <a:latin typeface="Consolas" panose="020B0609020204030204" pitchFamily="49" charset="0"/>
@@ -47702,11 +47801,12 @@
             </a:r>
           </a:p>
           <a:p>
-            <a:pPr>
-              <a:spcAft>
-                <a:spcPts val="500"/>
-              </a:spcAft>
-            </a:pPr>
+            <a:endParaRPr lang="en-CA" sz="1600" b="1" dirty="0">
+              <a:latin typeface="Consolas" panose="020B0609020204030204" pitchFamily="49" charset="0"/>
+              <a:ea typeface="M+ 1m" panose="020B0509020203020207" pitchFamily="49" charset="-128"/>
+            </a:endParaRPr>
+          </a:p>
+          <a:p>
             <a:r>
               <a:rPr lang="en-CA" sz="1600" b="1" dirty="0">
                 <a:latin typeface="Consolas" panose="020B0609020204030204" pitchFamily="49" charset="0"/>
@@ -47730,213 +47830,54 @@
             </a:r>
           </a:p>
           <a:p>
-            <a:pPr>
-              <a:spcAft>
-                <a:spcPts val="500"/>
-              </a:spcAft>
-            </a:pPr>
             <a:r>
               <a:rPr lang="en-CA" sz="1600" b="1" dirty="0">
                 <a:latin typeface="Consolas" panose="020B0609020204030204" pitchFamily="49" charset="0"/>
                 <a:ea typeface="M+ 1m" panose="020B0509020203020207" pitchFamily="49" charset="-128"/>
               </a:rPr>
-              <a:t>        Scanner </a:t>
+              <a:t>       </a:t>
             </a:r>
-            <a:r>
-              <a:rPr lang="en-CA" sz="1600" b="1" dirty="0" err="1">
-                <a:latin typeface="Consolas" panose="020B0609020204030204" pitchFamily="49" charset="0"/>
-                <a:ea typeface="M+ 1m" panose="020B0509020203020207" pitchFamily="49" charset="-128"/>
-              </a:rPr>
-              <a:t>sc</a:t>
-            </a:r>
+          </a:p>
+          <a:p>
             <a:r>
               <a:rPr lang="en-CA" sz="1600" b="1" dirty="0">
                 <a:latin typeface="Consolas" panose="020B0609020204030204" pitchFamily="49" charset="0"/>
                 <a:ea typeface="M+ 1m" panose="020B0509020203020207" pitchFamily="49" charset="-128"/>
               </a:rPr>
-              <a:t> = new Scanner(System.in);</a:t>
+              <a:t>        double loan = 1000.0;</a:t>
             </a:r>
           </a:p>
           <a:p>
-            <a:pPr>
-              <a:spcAft>
-                <a:spcPts val="500"/>
-              </a:spcAft>
-            </a:pPr>
             <a:r>
               <a:rPr lang="en-CA" sz="1600" b="1" dirty="0">
                 <a:latin typeface="Consolas" panose="020B0609020204030204" pitchFamily="49" charset="0"/>
                 <a:ea typeface="M+ 1m" panose="020B0509020203020207" pitchFamily="49" charset="-128"/>
               </a:rPr>
-              <a:t>        </a:t>
+              <a:t>	double interest = 0.05;</a:t>
             </a:r>
-            <a:r>
-              <a:rPr lang="en-CA" sz="1600" b="1" dirty="0" err="1">
-                <a:latin typeface="Consolas" panose="020B0609020204030204" pitchFamily="49" charset="0"/>
-                <a:ea typeface="M+ 1m" panose="020B0509020203020207" pitchFamily="49" charset="-128"/>
-              </a:rPr>
-              <a:t>System.out.print</a:t>
-            </a:r>
+          </a:p>
+          <a:p>
             <a:r>
               <a:rPr lang="en-CA" sz="1600" b="1" dirty="0">
                 <a:latin typeface="Consolas" panose="020B0609020204030204" pitchFamily="49" charset="0"/>
                 <a:ea typeface="M+ 1m" panose="020B0509020203020207" pitchFamily="49" charset="-128"/>
               </a:rPr>
-              <a:t>("           Loan: ");</a:t>
+              <a:t>	double term = 5;</a:t>
             </a:r>
           </a:p>
           <a:p>
-            <a:pPr>
-              <a:spcAft>
-                <a:spcPts val="500"/>
-              </a:spcAft>
-            </a:pPr>
+            <a:endParaRPr lang="en-CA" sz="1600" b="1" dirty="0">
+              <a:latin typeface="Consolas" panose="020B0609020204030204" pitchFamily="49" charset="0"/>
+              <a:ea typeface="M+ 1m" panose="020B0509020203020207" pitchFamily="49" charset="-128"/>
+            </a:endParaRPr>
+          </a:p>
+          <a:p>
             <a:r>
               <a:rPr lang="en-CA" sz="1600" b="1" dirty="0">
                 <a:latin typeface="Consolas" panose="020B0609020204030204" pitchFamily="49" charset="0"/>
                 <a:ea typeface="M+ 1m" panose="020B0509020203020207" pitchFamily="49" charset="-128"/>
               </a:rPr>
-              <a:t>        double loan = </a:t>
-            </a:r>
-            <a:r>
-              <a:rPr lang="en-CA" sz="1600" b="1" dirty="0" err="1">
-                <a:latin typeface="Consolas" panose="020B0609020204030204" pitchFamily="49" charset="0"/>
-                <a:ea typeface="M+ 1m" panose="020B0509020203020207" pitchFamily="49" charset="-128"/>
-              </a:rPr>
-              <a:t>sc.nextDouble</a:t>
-            </a:r>
-            <a:r>
-              <a:rPr lang="en-CA" sz="1600" b="1" dirty="0">
-                <a:latin typeface="Consolas" panose="020B0609020204030204" pitchFamily="49" charset="0"/>
-                <a:ea typeface="M+ 1m" panose="020B0509020203020207" pitchFamily="49" charset="-128"/>
-              </a:rPr>
-              <a:t>();</a:t>
-            </a:r>
-          </a:p>
-          <a:p>
-            <a:pPr>
-              <a:spcAft>
-                <a:spcPts val="500"/>
-              </a:spcAft>
-            </a:pPr>
-            <a:r>
-              <a:rPr lang="en-CA" sz="1600" b="1" dirty="0">
-                <a:latin typeface="Consolas" panose="020B0609020204030204" pitchFamily="49" charset="0"/>
-                <a:ea typeface="M+ 1m" panose="020B0509020203020207" pitchFamily="49" charset="-128"/>
-              </a:rPr>
-              <a:t>        </a:t>
-            </a:r>
-            <a:r>
-              <a:rPr lang="en-CA" sz="1600" b="1" dirty="0" err="1">
-                <a:latin typeface="Consolas" panose="020B0609020204030204" pitchFamily="49" charset="0"/>
-                <a:ea typeface="M+ 1m" panose="020B0509020203020207" pitchFamily="49" charset="-128"/>
-              </a:rPr>
-              <a:t>System.out.print</a:t>
-            </a:r>
-            <a:r>
-              <a:rPr lang="en-CA" sz="1600" b="1" dirty="0">
-                <a:latin typeface="Consolas" panose="020B0609020204030204" pitchFamily="49" charset="0"/>
-                <a:ea typeface="M+ 1m" panose="020B0509020203020207" pitchFamily="49" charset="-128"/>
-              </a:rPr>
-              <a:t>("       Interest: ");</a:t>
-            </a:r>
-          </a:p>
-          <a:p>
-            <a:pPr>
-              <a:spcAft>
-                <a:spcPts val="500"/>
-              </a:spcAft>
-            </a:pPr>
-            <a:r>
-              <a:rPr lang="en-CA" sz="1600" b="1" dirty="0">
-                <a:latin typeface="Consolas" panose="020B0609020204030204" pitchFamily="49" charset="0"/>
-                <a:ea typeface="M+ 1m" panose="020B0509020203020207" pitchFamily="49" charset="-128"/>
-              </a:rPr>
-              <a:t>        double interest = </a:t>
-            </a:r>
-            <a:r>
-              <a:rPr lang="en-CA" sz="1600" b="1" dirty="0" err="1">
-                <a:latin typeface="Consolas" panose="020B0609020204030204" pitchFamily="49" charset="0"/>
-                <a:ea typeface="M+ 1m" panose="020B0509020203020207" pitchFamily="49" charset="-128"/>
-              </a:rPr>
-              <a:t>sc.nextDouble</a:t>
-            </a:r>
-            <a:r>
-              <a:rPr lang="en-CA" sz="1600" b="1" dirty="0">
-                <a:latin typeface="Consolas" panose="020B0609020204030204" pitchFamily="49" charset="0"/>
-                <a:ea typeface="M+ 1m" panose="020B0509020203020207" pitchFamily="49" charset="-128"/>
-              </a:rPr>
-              <a:t>();</a:t>
-            </a:r>
-          </a:p>
-          <a:p>
-            <a:pPr>
-              <a:spcAft>
-                <a:spcPts val="500"/>
-              </a:spcAft>
-            </a:pPr>
-            <a:r>
-              <a:rPr lang="en-CA" sz="1600" b="1" dirty="0">
-                <a:latin typeface="Consolas" panose="020B0609020204030204" pitchFamily="49" charset="0"/>
-                <a:ea typeface="M+ 1m" panose="020B0509020203020207" pitchFamily="49" charset="-128"/>
-              </a:rPr>
-              <a:t>        </a:t>
-            </a:r>
-            <a:r>
-              <a:rPr lang="en-CA" sz="1600" b="1" dirty="0" err="1">
-                <a:latin typeface="Consolas" panose="020B0609020204030204" pitchFamily="49" charset="0"/>
-                <a:ea typeface="M+ 1m" panose="020B0509020203020207" pitchFamily="49" charset="-128"/>
-              </a:rPr>
-              <a:t>System.out.print</a:t>
-            </a:r>
-            <a:r>
-              <a:rPr lang="en-CA" sz="1600" b="1" dirty="0">
-                <a:latin typeface="Consolas" panose="020B0609020204030204" pitchFamily="49" charset="0"/>
-                <a:ea typeface="M+ 1m" panose="020B0509020203020207" pitchFamily="49" charset="-128"/>
-              </a:rPr>
-              <a:t>("           Term: ");</a:t>
-            </a:r>
-          </a:p>
-          <a:p>
-            <a:pPr>
-              <a:spcAft>
-                <a:spcPts val="500"/>
-              </a:spcAft>
-            </a:pPr>
-            <a:r>
-              <a:rPr lang="en-CA" sz="1600" b="1" dirty="0">
-                <a:latin typeface="Consolas" panose="020B0609020204030204" pitchFamily="49" charset="0"/>
-                <a:ea typeface="M+ 1m" panose="020B0509020203020207" pitchFamily="49" charset="-128"/>
-              </a:rPr>
-              <a:t>        double term = </a:t>
-            </a:r>
-            <a:r>
-              <a:rPr lang="en-CA" sz="1600" b="1" dirty="0" err="1">
-                <a:latin typeface="Consolas" panose="020B0609020204030204" pitchFamily="49" charset="0"/>
-                <a:ea typeface="M+ 1m" panose="020B0509020203020207" pitchFamily="49" charset="-128"/>
-              </a:rPr>
-              <a:t>sc.nextDouble</a:t>
-            </a:r>
-            <a:r>
-              <a:rPr lang="en-CA" sz="1600" b="1" dirty="0">
-                <a:latin typeface="Consolas" panose="020B0609020204030204" pitchFamily="49" charset="0"/>
-                <a:ea typeface="M+ 1m" panose="020B0509020203020207" pitchFamily="49" charset="-128"/>
-              </a:rPr>
-              <a:t>();</a:t>
-            </a:r>
-          </a:p>
-          <a:p>
-            <a:pPr>
-              <a:spcAft>
-                <a:spcPts val="500"/>
-              </a:spcAft>
-            </a:pPr>
-            <a:r>
-              <a:rPr lang="en-CA" sz="1600" b="1" dirty="0">
-                <a:latin typeface="Consolas" panose="020B0609020204030204" pitchFamily="49" charset="0"/>
-                <a:ea typeface="M+ 1m" panose="020B0509020203020207" pitchFamily="49" charset="-128"/>
-              </a:rPr>
-              <a:t>        double </a:t>
+              <a:t>        var </a:t>
             </a:r>
             <a:r>
               <a:rPr lang="en-CA" sz="1600" b="1" dirty="0" err="1">
@@ -47954,31 +47895,12 @@
             </a:r>
           </a:p>
           <a:p>
-            <a:pPr>
-              <a:spcAft>
-                <a:spcPts val="500"/>
-              </a:spcAft>
-            </a:pPr>
             <a:r>
               <a:rPr lang="en-CA" sz="1600" b="1" dirty="0">
                 <a:latin typeface="Consolas" panose="020B0609020204030204" pitchFamily="49" charset="0"/>
                 <a:ea typeface="M+ 1m" panose="020B0509020203020207" pitchFamily="49" charset="-128"/>
               </a:rPr>
-              <a:t>        double result = loan * </a:t>
-            </a:r>
-          </a:p>
-          <a:p>
-            <a:pPr>
-              <a:spcAft>
-                <a:spcPts val="500"/>
-              </a:spcAft>
-            </a:pPr>
-            <a:r>
-              <a:rPr lang="en-CA" sz="1600" b="1" dirty="0">
-                <a:latin typeface="Consolas" panose="020B0609020204030204" pitchFamily="49" charset="0"/>
-                <a:ea typeface="M+ 1m" panose="020B0509020203020207" pitchFamily="49" charset="-128"/>
-              </a:rPr>
-              <a:t>		(</a:t>
+              <a:t>        var result = loan * (</a:t>
             </a:r>
             <a:r>
               <a:rPr lang="en-CA" sz="1600" b="1" dirty="0" err="1">
@@ -48024,11 +47946,12 @@
             </a:r>
           </a:p>
           <a:p>
-            <a:pPr>
-              <a:spcAft>
-                <a:spcPts val="500"/>
-              </a:spcAft>
-            </a:pPr>
+            <a:endParaRPr lang="en-CA" sz="1600" b="1" dirty="0">
+              <a:latin typeface="Consolas" panose="020B0609020204030204" pitchFamily="49" charset="0"/>
+              <a:ea typeface="M+ 1m" panose="020B0509020203020207" pitchFamily="49" charset="-128"/>
+            </a:endParaRPr>
+          </a:p>
+          <a:p>
             <a:r>
               <a:rPr lang="en-CA" sz="1600" b="1" dirty="0">
                 <a:latin typeface="Consolas" panose="020B0609020204030204" pitchFamily="49" charset="0"/>
@@ -48041,36 +47964,17 @@
                 <a:latin typeface="Consolas" panose="020B0609020204030204" pitchFamily="49" charset="0"/>
                 <a:ea typeface="M+ 1m" panose="020B0509020203020207" pitchFamily="49" charset="-128"/>
               </a:rPr>
-              <a:t>System.out.println</a:t>
+              <a:t>System.out.printf</a:t>
             </a:r>
             <a:r>
               <a:rPr lang="en-CA" sz="1600" b="1" dirty="0">
                 <a:latin typeface="Consolas" panose="020B0609020204030204" pitchFamily="49" charset="0"/>
                 <a:ea typeface="M+ 1m" panose="020B0509020203020207" pitchFamily="49" charset="-128"/>
               </a:rPr>
-              <a:t>("Monthly Payment: " + </a:t>
+              <a:t>("Monthly Payment: %.2f%n", result);</a:t>
             </a:r>
-            <a:r>
-              <a:rPr lang="en-CA" sz="1600" b="1" dirty="0" err="1">
-                <a:latin typeface="Consolas" panose="020B0609020204030204" pitchFamily="49" charset="0"/>
-                <a:ea typeface="M+ 1m" panose="020B0509020203020207" pitchFamily="49" charset="-128"/>
-              </a:rPr>
-              <a:t>String.format</a:t>
-            </a:r>
-            <a:r>
-              <a:rPr lang="en-CA" sz="1600" b="1" dirty="0">
-                <a:latin typeface="Consolas" panose="020B0609020204030204" pitchFamily="49" charset="0"/>
-                <a:ea typeface="M+ 1m" panose="020B0509020203020207" pitchFamily="49" charset="-128"/>
-              </a:rPr>
-              <a:t>("%.2f", result));</a:t>
-            </a:r>
-          </a:p>
-          <a:p>
-            <a:pPr>
-              <a:spcAft>
-                <a:spcPts val="500"/>
-              </a:spcAft>
-            </a:pPr>
+          </a:p>
+          <a:p>
             <a:r>
               <a:rPr lang="en-CA" sz="1600" b="1" dirty="0">
                 <a:latin typeface="Consolas" panose="020B0609020204030204" pitchFamily="49" charset="0"/>
@@ -48080,11 +47984,6 @@
             </a:r>
           </a:p>
           <a:p>
-            <a:pPr>
-              <a:spcAft>
-                <a:spcPts val="500"/>
-              </a:spcAft>
-            </a:pPr>
             <a:r>
               <a:rPr lang="en-CA" sz="1600" b="1" dirty="0">
                 <a:latin typeface="Consolas" panose="020B0609020204030204" pitchFamily="49" charset="0"/>
@@ -48092,6 +47991,36 @@
               </a:rPr>
               <a:t>}</a:t>
             </a:r>
+          </a:p>
+          <a:p>
+            <a:endParaRPr lang="en-CA" sz="1600" b="1" dirty="0">
+              <a:latin typeface="Consolas" panose="020B0609020204030204" pitchFamily="49" charset="0"/>
+              <a:ea typeface="M+ 1m" panose="020B0509020203020207" pitchFamily="49" charset="-128"/>
+            </a:endParaRPr>
+          </a:p>
+          <a:p>
+            <a:r>
+              <a:rPr lang="en-CA" sz="1600" b="1" dirty="0">
+                <a:latin typeface="Consolas" panose="020B0609020204030204" pitchFamily="49" charset="0"/>
+                <a:ea typeface="M+ 1m" panose="020B0509020203020207" pitchFamily="49" charset="-128"/>
+              </a:rPr>
+              <a:t>// Single Source File Code example</a:t>
+            </a:r>
+          </a:p>
+          <a:p>
+            <a:r>
+              <a:rPr lang="en-CA" sz="1600" b="1" dirty="0">
+                <a:latin typeface="Consolas" panose="020B0609020204030204" pitchFamily="49" charset="0"/>
+                <a:ea typeface="M+ 1m" panose="020B0509020203020207" pitchFamily="49" charset="-128"/>
+              </a:rPr>
+              <a:t>// runs with java JavaCalculator01.java</a:t>
+            </a:r>
+          </a:p>
+          <a:p>
+            <a:endParaRPr lang="en-CA" sz="1600" b="1" dirty="0">
+              <a:latin typeface="Consolas" panose="020B0609020204030204" pitchFamily="49" charset="0"/>
+              <a:ea typeface="M+ 1m" panose="020B0509020203020207" pitchFamily="49" charset="-128"/>
+            </a:endParaRPr>
           </a:p>
         </p:txBody>
       </p:sp>
@@ -48206,20 +48135,20 @@
     </p:spTree>
     <p:extLst>
       <p:ext uri="{BB962C8B-B14F-4D97-AF65-F5344CB8AC3E}">
-        <p14:creationId xmlns:p14="http://schemas.microsoft.com/office/powerpoint/2010/main" val="1739267706"/>
+        <p14:creationId xmlns:p14="http://schemas.microsoft.com/office/powerpoint/2010/main" val="2861673191"/>
       </p:ext>
     </p:extLst>
   </p:cSld>
   <p:clrMapOvr>
     <a:masterClrMapping/>
   </p:clrMapOvr>
-  <mc:AlternateContent xmlns:mc="http://schemas.openxmlformats.org/markup-compatibility/2006">
-    <mc:Choice xmlns:p159="http://schemas.microsoft.com/office/powerpoint/2015/09/main" Requires="p159">
+  <mc:AlternateContent xmlns:mc="http://schemas.openxmlformats.org/markup-compatibility/2006" xmlns:p159="http://schemas.microsoft.com/office/powerpoint/2015/09/main">
+    <mc:Choice Requires="p159">
       <p:transition xmlns:p14="http://schemas.microsoft.com/office/powerpoint/2010/main" spd="slow" p14:dur="2000">
         <p159:morph option="byWord"/>
       </p:transition>
     </mc:Choice>
-    <mc:Fallback>
+    <mc:Fallback xmlns="">
       <p:transition spd="slow">
         <p:fade/>
       </p:transition>
@@ -48260,7 +48189,7 @@
         <p:spPr>
           <a:xfrm>
             <a:off x="1929284" y="817076"/>
-            <a:ext cx="9715469" cy="4683333"/>
+            <a:ext cx="10114224" cy="4993675"/>
           </a:xfrm>
           <a:prstGeom prst="rect">
             <a:avLst/>
@@ -48335,21 +48264,7 @@
                 <a:latin typeface="Consolas" panose="020B0609020204030204" pitchFamily="49" charset="0"/>
                 <a:ea typeface="M+ 1m" panose="020B0509020203020207" pitchFamily="49" charset="-128"/>
               </a:rPr>
-              <a:t>    Scanner </a:t>
-            </a:r>
-            <a:r>
-              <a:rPr lang="en-CA" sz="1600" b="1" dirty="0" err="1">
-                <a:latin typeface="Consolas" panose="020B0609020204030204" pitchFamily="49" charset="0"/>
-                <a:ea typeface="M+ 1m" panose="020B0509020203020207" pitchFamily="49" charset="-128"/>
-              </a:rPr>
-              <a:t>sc</a:t>
-            </a:r>
-            <a:r>
-              <a:rPr lang="en-CA" sz="1600" b="1" dirty="0">
-                <a:latin typeface="Consolas" panose="020B0609020204030204" pitchFamily="49" charset="0"/>
-                <a:ea typeface="M+ 1m" panose="020B0509020203020207" pitchFamily="49" charset="-128"/>
-              </a:rPr>
-              <a:t> = new Scanner(System.in);</a:t>
+              <a:t>       </a:t>
             </a:r>
           </a:p>
           <a:p>
@@ -48363,21 +48278,7 @@
                 <a:latin typeface="Consolas" panose="020B0609020204030204" pitchFamily="49" charset="0"/>
                 <a:ea typeface="M+ 1m" panose="020B0509020203020207" pitchFamily="49" charset="-128"/>
               </a:rPr>
-              <a:t>    </a:t>
-            </a:r>
-            <a:r>
-              <a:rPr lang="en-CA" sz="1600" b="1" dirty="0" err="1">
-                <a:latin typeface="Consolas" panose="020B0609020204030204" pitchFamily="49" charset="0"/>
-                <a:ea typeface="M+ 1m" panose="020B0509020203020207" pitchFamily="49" charset="-128"/>
-              </a:rPr>
-              <a:t>System.out.print</a:t>
-            </a:r>
-            <a:r>
-              <a:rPr lang="en-CA" sz="1600" b="1" dirty="0">
-                <a:latin typeface="Consolas" panose="020B0609020204030204" pitchFamily="49" charset="0"/>
-                <a:ea typeface="M+ 1m" panose="020B0509020203020207" pitchFamily="49" charset="-128"/>
-              </a:rPr>
-              <a:t>("           Loan: ");</a:t>
+              <a:t>    double loan = 1000.0;</a:t>
             </a:r>
           </a:p>
           <a:p>
@@ -48391,21 +48292,7 @@
                 <a:latin typeface="Consolas" panose="020B0609020204030204" pitchFamily="49" charset="0"/>
                 <a:ea typeface="M+ 1m" panose="020B0509020203020207" pitchFamily="49" charset="-128"/>
               </a:rPr>
-              <a:t>    double loan = </a:t>
-            </a:r>
-            <a:r>
-              <a:rPr lang="en-CA" sz="1600" b="1" dirty="0" err="1">
-                <a:latin typeface="Consolas" panose="020B0609020204030204" pitchFamily="49" charset="0"/>
-                <a:ea typeface="M+ 1m" panose="020B0509020203020207" pitchFamily="49" charset="-128"/>
-              </a:rPr>
-              <a:t>sc.nextDouble</a:t>
-            </a:r>
-            <a:r>
-              <a:rPr lang="en-CA" sz="1600" b="1" dirty="0">
-                <a:latin typeface="Consolas" panose="020B0609020204030204" pitchFamily="49" charset="0"/>
-                <a:ea typeface="M+ 1m" panose="020B0509020203020207" pitchFamily="49" charset="-128"/>
-              </a:rPr>
-              <a:t>();</a:t>
+              <a:t>    double interest = 0.05;</a:t>
             </a:r>
           </a:p>
           <a:p>
@@ -48419,22 +48306,19 @@
                 <a:latin typeface="Consolas" panose="020B0609020204030204" pitchFamily="49" charset="0"/>
                 <a:ea typeface="M+ 1m" panose="020B0509020203020207" pitchFamily="49" charset="-128"/>
               </a:rPr>
-              <a:t>    </a:t>
+              <a:t>    double term = 5;</a:t>
             </a:r>
-            <a:r>
-              <a:rPr lang="en-CA" sz="1600" b="1" dirty="0" err="1">
-                <a:latin typeface="Consolas" panose="020B0609020204030204" pitchFamily="49" charset="0"/>
-                <a:ea typeface="M+ 1m" panose="020B0509020203020207" pitchFamily="49" charset="-128"/>
-              </a:rPr>
-              <a:t>System.out.print</a:t>
-            </a:r>
-            <a:r>
-              <a:rPr lang="en-CA" sz="1600" b="1" dirty="0">
-                <a:latin typeface="Consolas" panose="020B0609020204030204" pitchFamily="49" charset="0"/>
-                <a:ea typeface="M+ 1m" panose="020B0509020203020207" pitchFamily="49" charset="-128"/>
-              </a:rPr>
-              <a:t>("       Interest: ");</a:t>
-            </a:r>
+          </a:p>
+          <a:p>
+            <a:pPr>
+              <a:spcAft>
+                <a:spcPts val="500"/>
+              </a:spcAft>
+            </a:pPr>
+            <a:endParaRPr lang="en-CA" sz="1600" b="1" dirty="0">
+              <a:latin typeface="Consolas" panose="020B0609020204030204" pitchFamily="49" charset="0"/>
+              <a:ea typeface="M+ 1m" panose="020B0509020203020207" pitchFamily="49" charset="-128"/>
+            </a:endParaRPr>
           </a:p>
           <a:p>
             <a:pPr>
@@ -48447,91 +48331,7 @@
                 <a:latin typeface="Consolas" panose="020B0609020204030204" pitchFamily="49" charset="0"/>
                 <a:ea typeface="M+ 1m" panose="020B0509020203020207" pitchFamily="49" charset="-128"/>
               </a:rPr>
-              <a:t>    double interest = </a:t>
-            </a:r>
-            <a:r>
-              <a:rPr lang="en-CA" sz="1600" b="1" dirty="0" err="1">
-                <a:latin typeface="Consolas" panose="020B0609020204030204" pitchFamily="49" charset="0"/>
-                <a:ea typeface="M+ 1m" panose="020B0509020203020207" pitchFamily="49" charset="-128"/>
-              </a:rPr>
-              <a:t>sc.nextDouble</a:t>
-            </a:r>
-            <a:r>
-              <a:rPr lang="en-CA" sz="1600" b="1" dirty="0">
-                <a:latin typeface="Consolas" panose="020B0609020204030204" pitchFamily="49" charset="0"/>
-                <a:ea typeface="M+ 1m" panose="020B0509020203020207" pitchFamily="49" charset="-128"/>
-              </a:rPr>
-              <a:t>();</a:t>
-            </a:r>
-          </a:p>
-          <a:p>
-            <a:pPr>
-              <a:spcAft>
-                <a:spcPts val="500"/>
-              </a:spcAft>
-            </a:pPr>
-            <a:r>
-              <a:rPr lang="en-CA" sz="1600" b="1" dirty="0">
-                <a:latin typeface="Consolas" panose="020B0609020204030204" pitchFamily="49" charset="0"/>
-                <a:ea typeface="M+ 1m" panose="020B0509020203020207" pitchFamily="49" charset="-128"/>
-              </a:rPr>
-              <a:t>    </a:t>
-            </a:r>
-            <a:r>
-              <a:rPr lang="en-CA" sz="1600" b="1" dirty="0" err="1">
-                <a:latin typeface="Consolas" panose="020B0609020204030204" pitchFamily="49" charset="0"/>
-                <a:ea typeface="M+ 1m" panose="020B0509020203020207" pitchFamily="49" charset="-128"/>
-              </a:rPr>
-              <a:t>System.out.print</a:t>
-            </a:r>
-            <a:r>
-              <a:rPr lang="en-CA" sz="1600" b="1" dirty="0">
-                <a:latin typeface="Consolas" panose="020B0609020204030204" pitchFamily="49" charset="0"/>
-                <a:ea typeface="M+ 1m" panose="020B0509020203020207" pitchFamily="49" charset="-128"/>
-              </a:rPr>
-              <a:t>("           Term: ");</a:t>
-            </a:r>
-          </a:p>
-          <a:p>
-            <a:pPr>
-              <a:spcAft>
-                <a:spcPts val="500"/>
-              </a:spcAft>
-            </a:pPr>
-            <a:r>
-              <a:rPr lang="en-CA" sz="1600" b="1" dirty="0">
-                <a:latin typeface="Consolas" panose="020B0609020204030204" pitchFamily="49" charset="0"/>
-                <a:ea typeface="M+ 1m" panose="020B0509020203020207" pitchFamily="49" charset="-128"/>
-              </a:rPr>
-              <a:t>    double term = </a:t>
-            </a:r>
-            <a:r>
-              <a:rPr lang="en-CA" sz="1600" b="1" dirty="0" err="1">
-                <a:latin typeface="Consolas" panose="020B0609020204030204" pitchFamily="49" charset="0"/>
-                <a:ea typeface="M+ 1m" panose="020B0509020203020207" pitchFamily="49" charset="-128"/>
-              </a:rPr>
-              <a:t>sc.nextDouble</a:t>
-            </a:r>
-            <a:r>
-              <a:rPr lang="en-CA" sz="1600" b="1" dirty="0">
-                <a:latin typeface="Consolas" panose="020B0609020204030204" pitchFamily="49" charset="0"/>
-                <a:ea typeface="M+ 1m" panose="020B0509020203020207" pitchFamily="49" charset="-128"/>
-              </a:rPr>
-              <a:t>();</a:t>
-            </a:r>
-          </a:p>
-          <a:p>
-            <a:pPr>
-              <a:spcAft>
-                <a:spcPts val="500"/>
-              </a:spcAft>
-            </a:pPr>
-            <a:r>
-              <a:rPr lang="en-CA" sz="1600" b="1" dirty="0">
-                <a:latin typeface="Consolas" panose="020B0609020204030204" pitchFamily="49" charset="0"/>
-                <a:ea typeface="M+ 1m" panose="020B0509020203020207" pitchFamily="49" charset="-128"/>
-              </a:rPr>
-              <a:t>    double </a:t>
+              <a:t>    var </a:t>
             </a:r>
             <a:r>
               <a:rPr lang="en-CA" sz="1600" b="1" dirty="0" err="1">
@@ -48559,21 +48359,7 @@
                 <a:latin typeface="Consolas" panose="020B0609020204030204" pitchFamily="49" charset="0"/>
                 <a:ea typeface="M+ 1m" panose="020B0509020203020207" pitchFamily="49" charset="-128"/>
               </a:rPr>
-              <a:t>    double result = loan * </a:t>
-            </a:r>
-          </a:p>
-          <a:p>
-            <a:pPr>
-              <a:spcAft>
-                <a:spcPts val="500"/>
-              </a:spcAft>
-            </a:pPr>
-            <a:r>
-              <a:rPr lang="en-CA" sz="1600" b="1" dirty="0">
-                <a:latin typeface="Consolas" panose="020B0609020204030204" pitchFamily="49" charset="0"/>
-                <a:ea typeface="M+ 1m" panose="020B0509020203020207" pitchFamily="49" charset="-128"/>
-              </a:rPr>
-              <a:t>	(</a:t>
+              <a:t>    var result = loan * (</a:t>
             </a:r>
             <a:r>
               <a:rPr lang="en-CA" sz="1600" b="1" dirty="0" err="1">
@@ -48624,6 +48410,17 @@
                 <a:spcPts val="500"/>
               </a:spcAft>
             </a:pPr>
+            <a:endParaRPr lang="en-CA" sz="1600" b="1" dirty="0">
+              <a:latin typeface="Consolas" panose="020B0609020204030204" pitchFamily="49" charset="0"/>
+              <a:ea typeface="M+ 1m" panose="020B0509020203020207" pitchFamily="49" charset="-128"/>
+            </a:endParaRPr>
+          </a:p>
+          <a:p>
+            <a:pPr>
+              <a:spcAft>
+                <a:spcPts val="500"/>
+              </a:spcAft>
+            </a:pPr>
             <a:r>
               <a:rPr lang="en-CA" sz="1600" b="1" dirty="0">
                 <a:latin typeface="Consolas" panose="020B0609020204030204" pitchFamily="49" charset="0"/>
@@ -48636,28 +48433,14 @@
                 <a:latin typeface="Consolas" panose="020B0609020204030204" pitchFamily="49" charset="0"/>
                 <a:ea typeface="M+ 1m" panose="020B0509020203020207" pitchFamily="49" charset="-128"/>
               </a:rPr>
-              <a:t>System.out.println</a:t>
+              <a:t>System.out.printf</a:t>
             </a:r>
             <a:r>
               <a:rPr lang="en-CA" sz="1600" b="1" dirty="0">
                 <a:latin typeface="Consolas" panose="020B0609020204030204" pitchFamily="49" charset="0"/>
                 <a:ea typeface="M+ 1m" panose="020B0509020203020207" pitchFamily="49" charset="-128"/>
               </a:rPr>
-              <a:t>("Monthly Payment: " + </a:t>
-            </a:r>
-            <a:r>
-              <a:rPr lang="en-CA" sz="1600" b="1" dirty="0" err="1">
-                <a:latin typeface="Consolas" panose="020B0609020204030204" pitchFamily="49" charset="0"/>
-                <a:ea typeface="M+ 1m" panose="020B0509020203020207" pitchFamily="49" charset="-128"/>
-              </a:rPr>
-              <a:t>String.format</a:t>
-            </a:r>
-            <a:r>
-              <a:rPr lang="en-CA" sz="1600" b="1" dirty="0">
-                <a:latin typeface="Consolas" panose="020B0609020204030204" pitchFamily="49" charset="0"/>
-                <a:ea typeface="M+ 1m" panose="020B0509020203020207" pitchFamily="49" charset="-128"/>
-              </a:rPr>
-              <a:t>("%.2f", result));</a:t>
+              <a:t>("Monthly Payment: %.2f%n", result);</a:t>
             </a:r>
           </a:p>
           <a:p>
@@ -48672,6 +48455,45 @@
                 <a:ea typeface="M+ 1m" panose="020B0509020203020207" pitchFamily="49" charset="-128"/>
               </a:rPr>
               <a:t>}</a:t>
+            </a:r>
+          </a:p>
+          <a:p>
+            <a:pPr>
+              <a:spcAft>
+                <a:spcPts val="500"/>
+              </a:spcAft>
+            </a:pPr>
+            <a:endParaRPr lang="en-CA" sz="1600" b="1" dirty="0">
+              <a:latin typeface="Consolas" panose="020B0609020204030204" pitchFamily="49" charset="0"/>
+              <a:ea typeface="M+ 1m" panose="020B0509020203020207" pitchFamily="49" charset="-128"/>
+            </a:endParaRPr>
+          </a:p>
+          <a:p>
+            <a:pPr>
+              <a:spcAft>
+                <a:spcPts val="500"/>
+              </a:spcAft>
+            </a:pPr>
+            <a:r>
+              <a:rPr lang="en-CA" sz="1600" b="1" dirty="0">
+                <a:latin typeface="Consolas" panose="020B0609020204030204" pitchFamily="49" charset="0"/>
+                <a:ea typeface="M+ 1m" panose="020B0509020203020207" pitchFamily="49" charset="-128"/>
+              </a:rPr>
+              <a:t>// Single Source File Code example</a:t>
+            </a:r>
+          </a:p>
+          <a:p>
+            <a:pPr>
+              <a:spcAft>
+                <a:spcPts val="500"/>
+              </a:spcAft>
+            </a:pPr>
+            <a:r>
+              <a:rPr lang="en-CA" sz="1600" b="1" dirty="0">
+                <a:latin typeface="Consolas" panose="020B0609020204030204" pitchFamily="49" charset="0"/>
+                <a:ea typeface="M+ 1m" panose="020B0509020203020207" pitchFamily="49" charset="-128"/>
+              </a:rPr>
+              <a:t>// runs with java --enable-preview --source 21 JavaCalculator01N.java</a:t>
             </a:r>
           </a:p>
         </p:txBody>
@@ -48787,20 +48609,20 @@
     </p:spTree>
     <p:extLst>
       <p:ext uri="{BB962C8B-B14F-4D97-AF65-F5344CB8AC3E}">
-        <p14:creationId xmlns:p14="http://schemas.microsoft.com/office/powerpoint/2010/main" val="263328210"/>
+        <p14:creationId xmlns:p14="http://schemas.microsoft.com/office/powerpoint/2010/main" val="2512527130"/>
       </p:ext>
     </p:extLst>
   </p:cSld>
   <p:clrMapOvr>
     <a:masterClrMapping/>
   </p:clrMapOvr>
-  <mc:AlternateContent xmlns:mc="http://schemas.openxmlformats.org/markup-compatibility/2006">
-    <mc:Choice xmlns:p159="http://schemas.microsoft.com/office/powerpoint/2015/09/main" Requires="p159">
+  <mc:AlternateContent xmlns:mc="http://schemas.openxmlformats.org/markup-compatibility/2006" xmlns:p159="http://schemas.microsoft.com/office/powerpoint/2015/09/main">
+    <mc:Choice Requires="p159">
       <p:transition xmlns:p14="http://schemas.microsoft.com/office/powerpoint/2010/main" spd="slow" p14:dur="2000">
         <p159:morph option="byWord"/>
       </p:transition>
     </mc:Choice>
-    <mc:Fallback>
+    <mc:Fallback xmlns="">
       <p:transition spd="slow">
         <p:fade/>
       </p:transition>
@@ -49370,13 +49192,13 @@
   <p:clrMapOvr>
     <a:masterClrMapping/>
   </p:clrMapOvr>
-  <mc:AlternateContent xmlns:mc="http://schemas.openxmlformats.org/markup-compatibility/2006">
-    <mc:Choice xmlns:p159="http://schemas.microsoft.com/office/powerpoint/2015/09/main" Requires="p159">
+  <mc:AlternateContent xmlns:mc="http://schemas.openxmlformats.org/markup-compatibility/2006" xmlns:p159="http://schemas.microsoft.com/office/powerpoint/2015/09/main">
+    <mc:Choice Requires="p159">
       <p:transition xmlns:p14="http://schemas.microsoft.com/office/powerpoint/2010/main" spd="slow" p14:dur="2000">
         <p159:morph option="byWord"/>
       </p:transition>
     </mc:Choice>
-    <mc:Fallback>
+    <mc:Fallback xmlns="">
       <p:transition spd="slow">
         <p:fade/>
       </p:transition>
@@ -50233,13 +50055,13 @@
   <p:clrMapOvr>
     <a:masterClrMapping/>
   </p:clrMapOvr>
-  <mc:AlternateContent xmlns:mc="http://schemas.openxmlformats.org/markup-compatibility/2006">
-    <mc:Choice xmlns:p159="http://schemas.microsoft.com/office/powerpoint/2015/09/main" Requires="p159">
+  <mc:AlternateContent xmlns:mc="http://schemas.openxmlformats.org/markup-compatibility/2006" xmlns:p159="http://schemas.microsoft.com/office/powerpoint/2015/09/main">
+    <mc:Choice Requires="p159">
       <p:transition xmlns:p14="http://schemas.microsoft.com/office/powerpoint/2010/main" spd="slow" p14:dur="2000">
         <p159:morph option="byWord"/>
       </p:transition>
     </mc:Choice>
-    <mc:Fallback>
+    <mc:Fallback xmlns="">
       <p:transition spd="slow">
         <p:fade/>
       </p:transition>
@@ -51290,13 +51112,13 @@
   <p:clrMapOvr>
     <a:masterClrMapping/>
   </p:clrMapOvr>
-  <mc:AlternateContent xmlns:mc="http://schemas.openxmlformats.org/markup-compatibility/2006">
-    <mc:Choice xmlns:p159="http://schemas.microsoft.com/office/powerpoint/2015/09/main" Requires="p159">
+  <mc:AlternateContent xmlns:mc="http://schemas.openxmlformats.org/markup-compatibility/2006" xmlns:p159="http://schemas.microsoft.com/office/powerpoint/2015/09/main">
+    <mc:Choice Requires="p159">
       <p:transition xmlns:p14="http://schemas.microsoft.com/office/powerpoint/2010/main" spd="slow" p14:dur="2000">
         <p159:morph option="byWord"/>
       </p:transition>
     </mc:Choice>
-    <mc:Fallback>
+    <mc:Fallback xmlns="">
       <p:transition spd="slow">
         <p:fade/>
       </p:transition>
@@ -51787,13 +51609,13 @@
   <p:clrMapOvr>
     <a:masterClrMapping/>
   </p:clrMapOvr>
-  <mc:AlternateContent xmlns:mc="http://schemas.openxmlformats.org/markup-compatibility/2006">
-    <mc:Choice xmlns:p159="http://schemas.microsoft.com/office/powerpoint/2015/09/main" Requires="p159">
+  <mc:AlternateContent xmlns:mc="http://schemas.openxmlformats.org/markup-compatibility/2006" xmlns:p159="http://schemas.microsoft.com/office/powerpoint/2015/09/main">
+    <mc:Choice Requires="p159">
       <p:transition xmlns:p14="http://schemas.microsoft.com/office/powerpoint/2010/main" spd="slow" p14:dur="2000">
         <p159:morph option="byWord"/>
       </p:transition>
     </mc:Choice>
-    <mc:Fallback>
+    <mc:Fallback xmlns="">
       <p:transition spd="slow">
         <p:fade/>
       </p:transition>
@@ -52256,13 +52078,13 @@
   <p:clrMapOvr>
     <a:masterClrMapping/>
   </p:clrMapOvr>
-  <mc:AlternateContent xmlns:mc="http://schemas.openxmlformats.org/markup-compatibility/2006">
-    <mc:Choice xmlns:p159="http://schemas.microsoft.com/office/powerpoint/2015/09/main" Requires="p159">
+  <mc:AlternateContent xmlns:mc="http://schemas.openxmlformats.org/markup-compatibility/2006" xmlns:p159="http://schemas.microsoft.com/office/powerpoint/2015/09/main">
+    <mc:Choice Requires="p159">
       <p:transition xmlns:p14="http://schemas.microsoft.com/office/powerpoint/2010/main" spd="slow" p14:dur="2000">
         <p159:morph option="byWord"/>
       </p:transition>
     </mc:Choice>
-    <mc:Fallback>
+    <mc:Fallback xmlns="">
       <p:transition spd="slow">
         <p:fade/>
       </p:transition>
@@ -52562,13 +52384,13 @@
   <p:clrMapOvr>
     <a:masterClrMapping/>
   </p:clrMapOvr>
-  <mc:AlternateContent xmlns:mc="http://schemas.openxmlformats.org/markup-compatibility/2006">
-    <mc:Choice xmlns:p159="http://schemas.microsoft.com/office/powerpoint/2015/09/main" Requires="p159">
+  <mc:AlternateContent xmlns:mc="http://schemas.openxmlformats.org/markup-compatibility/2006" xmlns:p159="http://schemas.microsoft.com/office/powerpoint/2015/09/main">
+    <mc:Choice Requires="p159">
       <p:transition xmlns:p14="http://schemas.microsoft.com/office/powerpoint/2010/main" spd="slow" p14:dur="2000">
         <p159:morph option="byWord"/>
       </p:transition>
     </mc:Choice>
-    <mc:Fallback>
+    <mc:Fallback xmlns="">
       <p:transition spd="slow">
         <p:fade/>
       </p:transition>
@@ -52908,13 +52730,13 @@
   <p:clrMapOvr>
     <a:masterClrMapping/>
   </p:clrMapOvr>
-  <mc:AlternateContent xmlns:mc="http://schemas.openxmlformats.org/markup-compatibility/2006">
-    <mc:Choice xmlns:p159="http://schemas.microsoft.com/office/powerpoint/2015/09/main" Requires="p159">
+  <mc:AlternateContent xmlns:mc="http://schemas.openxmlformats.org/markup-compatibility/2006" xmlns:p159="http://schemas.microsoft.com/office/powerpoint/2015/09/main">
+    <mc:Choice Requires="p159">
       <p:transition xmlns:p14="http://schemas.microsoft.com/office/powerpoint/2010/main" spd="slow" p14:dur="2000">
         <p159:morph option="byWord"/>
       </p:transition>
     </mc:Choice>
-    <mc:Fallback>
+    <mc:Fallback xmlns="">
       <p:transition spd="slow">
         <p:fade/>
       </p:transition>
@@ -53062,13 +52884,13 @@
   <p:clrMapOvr>
     <a:masterClrMapping/>
   </p:clrMapOvr>
-  <mc:AlternateContent xmlns:mc="http://schemas.openxmlformats.org/markup-compatibility/2006">
-    <mc:Choice xmlns:p159="http://schemas.microsoft.com/office/powerpoint/2015/09/main" Requires="p159">
+  <mc:AlternateContent xmlns:mc="http://schemas.openxmlformats.org/markup-compatibility/2006" xmlns:p159="http://schemas.microsoft.com/office/powerpoint/2015/09/main">
+    <mc:Choice Requires="p159">
       <p:transition xmlns:p14="http://schemas.microsoft.com/office/powerpoint/2010/main" spd="slow" p14:dur="2000">
         <p159:morph option="byWord"/>
       </p:transition>
     </mc:Choice>
-    <mc:Fallback>
+    <mc:Fallback xmlns="">
       <p:transition spd="slow">
         <p:fade/>
       </p:transition>
@@ -56421,13 +56243,13 @@
   <p:clrMapOvr>
     <a:masterClrMapping/>
   </p:clrMapOvr>
-  <mc:AlternateContent xmlns:mc="http://schemas.openxmlformats.org/markup-compatibility/2006">
-    <mc:Choice xmlns:p159="http://schemas.microsoft.com/office/powerpoint/2015/09/main" Requires="p159">
+  <mc:AlternateContent xmlns:mc="http://schemas.openxmlformats.org/markup-compatibility/2006" xmlns:p159="http://schemas.microsoft.com/office/powerpoint/2015/09/main">
+    <mc:Choice Requires="p159">
       <p:transition xmlns:p14="http://schemas.microsoft.com/office/powerpoint/2010/main" spd="slow" p14:dur="2000">
         <p159:morph option="byWord"/>
       </p:transition>
     </mc:Choice>
-    <mc:Fallback>
+    <mc:Fallback xmlns="">
       <p:transition spd="slow">
         <p:fade/>
       </p:transition>
@@ -56880,13 +56702,13 @@
   <p:clrMapOvr>
     <a:masterClrMapping/>
   </p:clrMapOvr>
-  <mc:AlternateContent xmlns:mc="http://schemas.openxmlformats.org/markup-compatibility/2006">
-    <mc:Choice xmlns:p159="http://schemas.microsoft.com/office/powerpoint/2015/09/main" Requires="p159">
+  <mc:AlternateContent xmlns:mc="http://schemas.openxmlformats.org/markup-compatibility/2006" xmlns:p159="http://schemas.microsoft.com/office/powerpoint/2015/09/main">
+    <mc:Choice Requires="p159">
       <p:transition xmlns:p14="http://schemas.microsoft.com/office/powerpoint/2010/main" spd="slow" p14:dur="2000">
         <p159:morph option="byWord"/>
       </p:transition>
     </mc:Choice>
-    <mc:Fallback>
+    <mc:Fallback xmlns="">
       <p:transition spd="slow">
         <p:fade/>
       </p:transition>
@@ -57484,13 +57306,13 @@
   <p:clrMapOvr>
     <a:masterClrMapping/>
   </p:clrMapOvr>
-  <mc:AlternateContent xmlns:mc="http://schemas.openxmlformats.org/markup-compatibility/2006">
-    <mc:Choice xmlns:p159="http://schemas.microsoft.com/office/powerpoint/2015/09/main" Requires="p159">
+  <mc:AlternateContent xmlns:mc="http://schemas.openxmlformats.org/markup-compatibility/2006" xmlns:p159="http://schemas.microsoft.com/office/powerpoint/2015/09/main">
+    <mc:Choice Requires="p159">
       <p:transition xmlns:p14="http://schemas.microsoft.com/office/powerpoint/2010/main" spd="slow" p14:dur="2000">
         <p159:morph option="byWord"/>
       </p:transition>
     </mc:Choice>
-    <mc:Fallback>
+    <mc:Fallback xmlns="">
       <p:transition spd="slow">
         <p:fade/>
       </p:transition>
@@ -58218,13 +58040,13 @@
   <p:clrMapOvr>
     <a:masterClrMapping/>
   </p:clrMapOvr>
-  <mc:AlternateContent xmlns:mc="http://schemas.openxmlformats.org/markup-compatibility/2006">
-    <mc:Choice xmlns:p159="http://schemas.microsoft.com/office/powerpoint/2015/09/main" Requires="p159">
+  <mc:AlternateContent xmlns:mc="http://schemas.openxmlformats.org/markup-compatibility/2006" xmlns:p159="http://schemas.microsoft.com/office/powerpoint/2015/09/main">
+    <mc:Choice Requires="p159">
       <p:transition xmlns:p14="http://schemas.microsoft.com/office/powerpoint/2010/main" spd="slow" p14:dur="2000">
         <p159:morph option="byWord"/>
       </p:transition>
     </mc:Choice>
-    <mc:Fallback>
+    <mc:Fallback xmlns="">
       <p:transition spd="slow">
         <p:fade/>
       </p:transition>

</xml_diff>

<commit_message>
Removed unneeded import from first Java example vs Python
</commit_message>
<xml_diff>
--- a/Java in Education For JUGs 2.0 without notes.pptx
+++ b/Java in Education For JUGs 2.0 without notes.pptx
@@ -47751,7 +47751,7 @@
         <p:spPr>
           <a:xfrm>
             <a:off x="1735015" y="817076"/>
-            <a:ext cx="10456985" cy="5016758"/>
+            <a:ext cx="10456985" cy="4524315"/>
           </a:xfrm>
           <a:prstGeom prst="rect">
             <a:avLst/>
@@ -47762,35 +47762,6 @@
             <a:spAutoFit/>
           </a:bodyPr>
           <a:lstStyle/>
-          <a:p>
-            <a:r>
-              <a:rPr lang="en-CA" sz="1600" b="1" dirty="0">
-                <a:latin typeface="Consolas" panose="020B0609020204030204" pitchFamily="49" charset="0"/>
-                <a:ea typeface="M+ 1m" panose="020B0509020203020207" pitchFamily="49" charset="-128"/>
-              </a:rPr>
-              <a:t>import </a:t>
-            </a:r>
-            <a:r>
-              <a:rPr lang="en-CA" sz="1600" b="1" dirty="0" err="1">
-                <a:latin typeface="Consolas" panose="020B0609020204030204" pitchFamily="49" charset="0"/>
-                <a:ea typeface="M+ 1m" panose="020B0509020203020207" pitchFamily="49" charset="-128"/>
-              </a:rPr>
-              <a:t>java.util.Scanner</a:t>
-            </a:r>
-            <a:r>
-              <a:rPr lang="en-CA" sz="1600" b="1" dirty="0">
-                <a:latin typeface="Consolas" panose="020B0609020204030204" pitchFamily="49" charset="0"/>
-                <a:ea typeface="M+ 1m" panose="020B0509020203020207" pitchFamily="49" charset="-128"/>
-              </a:rPr>
-              <a:t>;</a:t>
-            </a:r>
-          </a:p>
-          <a:p>
-            <a:endParaRPr lang="en-CA" sz="1600" b="1" dirty="0">
-              <a:latin typeface="Consolas" panose="020B0609020204030204" pitchFamily="49" charset="0"/>
-              <a:ea typeface="M+ 1m" panose="020B0509020203020207" pitchFamily="49" charset="-128"/>
-            </a:endParaRPr>
-          </a:p>
           <a:p>
             <a:r>
               <a:rPr lang="en-CA" sz="1600" b="1" dirty="0">
@@ -48189,7 +48160,7 @@
         <p:spPr>
           <a:xfrm>
             <a:off x="1929284" y="817076"/>
-            <a:ext cx="10114224" cy="4993675"/>
+            <a:ext cx="10114224" cy="4372992"/>
           </a:xfrm>
           <a:prstGeom prst="rect">
             <a:avLst/>
@@ -48200,45 +48171,6 @@
             <a:spAutoFit/>
           </a:bodyPr>
           <a:lstStyle/>
-          <a:p>
-            <a:pPr>
-              <a:spcAft>
-                <a:spcPts val="500"/>
-              </a:spcAft>
-            </a:pPr>
-            <a:r>
-              <a:rPr lang="en-CA" sz="1600" b="1" dirty="0">
-                <a:latin typeface="Consolas" panose="020B0609020204030204" pitchFamily="49" charset="0"/>
-                <a:ea typeface="M+ 1m" panose="020B0509020203020207" pitchFamily="49" charset="-128"/>
-              </a:rPr>
-              <a:t>import </a:t>
-            </a:r>
-            <a:r>
-              <a:rPr lang="en-CA" sz="1600" b="1" dirty="0" err="1">
-                <a:latin typeface="Consolas" panose="020B0609020204030204" pitchFamily="49" charset="0"/>
-                <a:ea typeface="M+ 1m" panose="020B0509020203020207" pitchFamily="49" charset="-128"/>
-              </a:rPr>
-              <a:t>java.util.Scanner</a:t>
-            </a:r>
-            <a:r>
-              <a:rPr lang="en-CA" sz="1600" b="1" dirty="0">
-                <a:latin typeface="Consolas" panose="020B0609020204030204" pitchFamily="49" charset="0"/>
-                <a:ea typeface="M+ 1m" panose="020B0509020203020207" pitchFamily="49" charset="-128"/>
-              </a:rPr>
-              <a:t>;</a:t>
-            </a:r>
-          </a:p>
-          <a:p>
-            <a:pPr>
-              <a:spcAft>
-                <a:spcPts val="500"/>
-              </a:spcAft>
-            </a:pPr>
-            <a:endParaRPr lang="en-CA" sz="1600" b="1" dirty="0">
-              <a:latin typeface="Consolas" panose="020B0609020204030204" pitchFamily="49" charset="0"/>
-              <a:ea typeface="M+ 1m" panose="020B0509020203020207" pitchFamily="49" charset="-128"/>
-            </a:endParaRPr>
-          </a:p>
           <a:p>
             <a:pPr>
               <a:spcAft>

</xml_diff>

<commit_message>
Removed unneeded semi colons from Python Examples
</commit_message>
<xml_diff>
--- a/Java in Education For JUGs 2.0 without notes.pptx
+++ b/Java in Education For JUGs 2.0 without notes.pptx
@@ -47621,7 +47621,7 @@
               <a:rPr lang="en-US" sz="1600" b="1" dirty="0">
                 <a:latin typeface="Consolas" panose="020B0609020204030204" pitchFamily="49" charset="0"/>
               </a:rPr>
-              <a:t> = float(interest) / 12;</a:t>
+              <a:t> = float(interest) / 12</a:t>
             </a:r>
           </a:p>
           <a:p>
@@ -47671,8 +47671,17 @@
               <a:rPr lang="en-US" sz="1600" b="1" dirty="0">
                 <a:latin typeface="Consolas" panose="020B0609020204030204" pitchFamily="49" charset="0"/>
               </a:rPr>
-              <a:t>) ** -float(term))));</a:t>
+              <a:t>) ** -float(</a:t>
             </a:r>
+            <a:r>
+              <a:rPr lang="en-US" sz="1600" b="1">
+                <a:latin typeface="Consolas" panose="020B0609020204030204" pitchFamily="49" charset="0"/>
+              </a:rPr>
+              <a:t>term))))</a:t>
+            </a:r>
+            <a:endParaRPr lang="en-US" sz="1600" b="1" dirty="0">
+              <a:latin typeface="Consolas" panose="020B0609020204030204" pitchFamily="49" charset="0"/>
+            </a:endParaRPr>
           </a:p>
           <a:p>
             <a:pPr>

</xml_diff>

<commit_message>
Changes based on Java in Education meeting
Used var in more places
</commit_message>
<xml_diff>
--- a/Java in Education For JUGs 2.0 without notes.pptx
+++ b/Java in Education For JUGs 2.0 without notes.pptx
@@ -47823,7 +47823,7 @@
                 <a:latin typeface="Consolas" panose="020B0609020204030204" pitchFamily="49" charset="0"/>
                 <a:ea typeface="M+ 1m" panose="020B0509020203020207" pitchFamily="49" charset="-128"/>
               </a:rPr>
-              <a:t>        double loan = 1000.0;</a:t>
+              <a:t>        var loan = 1000.0;</a:t>
             </a:r>
           </a:p>
           <a:p>
@@ -47832,7 +47832,7 @@
                 <a:latin typeface="Consolas" panose="020B0609020204030204" pitchFamily="49" charset="0"/>
                 <a:ea typeface="M+ 1m" panose="020B0509020203020207" pitchFamily="49" charset="-128"/>
               </a:rPr>
-              <a:t>	double interest = 0.05;</a:t>
+              <a:t>	var interest = 0.05;</a:t>
             </a:r>
           </a:p>
           <a:p>
@@ -47841,7 +47841,7 @@
                 <a:latin typeface="Consolas" panose="020B0609020204030204" pitchFamily="49" charset="0"/>
                 <a:ea typeface="M+ 1m" panose="020B0509020203020207" pitchFamily="49" charset="-128"/>
               </a:rPr>
-              <a:t>	double term = 5;</a:t>
+              <a:t>	var term = 5;</a:t>
             </a:r>
           </a:p>
           <a:p>
@@ -48218,7 +48218,7 @@
                 <a:latin typeface="Consolas" panose="020B0609020204030204" pitchFamily="49" charset="0"/>
                 <a:ea typeface="M+ 1m" panose="020B0509020203020207" pitchFamily="49" charset="-128"/>
               </a:rPr>
-              <a:t>    double loan = 1000.0;</a:t>
+              <a:t>    var loan = 1000.0;</a:t>
             </a:r>
           </a:p>
           <a:p>
@@ -48232,7 +48232,7 @@
                 <a:latin typeface="Consolas" panose="020B0609020204030204" pitchFamily="49" charset="0"/>
                 <a:ea typeface="M+ 1m" panose="020B0509020203020207" pitchFamily="49" charset="-128"/>
               </a:rPr>
-              <a:t>    double interest = 0.05;</a:t>
+              <a:t>    var interest = 0.05;</a:t>
             </a:r>
           </a:p>
           <a:p>
@@ -48246,7 +48246,7 @@
                 <a:latin typeface="Consolas" panose="020B0609020204030204" pitchFamily="49" charset="0"/>
                 <a:ea typeface="M+ 1m" panose="020B0509020203020207" pitchFamily="49" charset="-128"/>
               </a:rPr>
-              <a:t>    double term = 5;</a:t>
+              <a:t>    var term = 5;</a:t>
             </a:r>
           </a:p>
           <a:p>

</xml_diff>